<commit_message>
Slapped up the fattest UI
</commit_message>
<xml_diff>
--- a/UI.pptx
+++ b/UI.pptx
@@ -6,7 +6,8 @@
   </p:sldMasterIdLst>
   <p:sldIdLst>
     <p:sldId id="256" r:id="rId2"/>
-    <p:sldId id="257" r:id="rId3"/>
+    <p:sldId id="258" r:id="rId3"/>
+    <p:sldId id="257" r:id="rId4"/>
   </p:sldIdLst>
   <p:sldSz cx="12192000" cy="6858000"/>
   <p:notesSz cx="6858000" cy="9144000"/>
@@ -262,7 +263,7 @@
           <a:p>
             <a:fld id="{F50A9E13-E3E1-4A58-855D-9850BB79EC8F}" type="datetimeFigureOut">
               <a:rPr lang="en-GB" smtClean="0"/>
-              <a:t>23/05/2023</a:t>
+              <a:t>24/05/2023</a:t>
             </a:fld>
             <a:endParaRPr lang="en-GB"/>
           </a:p>
@@ -462,7 +463,7 @@
           <a:p>
             <a:fld id="{F50A9E13-E3E1-4A58-855D-9850BB79EC8F}" type="datetimeFigureOut">
               <a:rPr lang="en-GB" smtClean="0"/>
-              <a:t>23/05/2023</a:t>
+              <a:t>24/05/2023</a:t>
             </a:fld>
             <a:endParaRPr lang="en-GB"/>
           </a:p>
@@ -672,7 +673,7 @@
           <a:p>
             <a:fld id="{F50A9E13-E3E1-4A58-855D-9850BB79EC8F}" type="datetimeFigureOut">
               <a:rPr lang="en-GB" smtClean="0"/>
-              <a:t>23/05/2023</a:t>
+              <a:t>24/05/2023</a:t>
             </a:fld>
             <a:endParaRPr lang="en-GB"/>
           </a:p>
@@ -872,7 +873,7 @@
           <a:p>
             <a:fld id="{F50A9E13-E3E1-4A58-855D-9850BB79EC8F}" type="datetimeFigureOut">
               <a:rPr lang="en-GB" smtClean="0"/>
-              <a:t>23/05/2023</a:t>
+              <a:t>24/05/2023</a:t>
             </a:fld>
             <a:endParaRPr lang="en-GB"/>
           </a:p>
@@ -1148,7 +1149,7 @@
           <a:p>
             <a:fld id="{F50A9E13-E3E1-4A58-855D-9850BB79EC8F}" type="datetimeFigureOut">
               <a:rPr lang="en-GB" smtClean="0"/>
-              <a:t>23/05/2023</a:t>
+              <a:t>24/05/2023</a:t>
             </a:fld>
             <a:endParaRPr lang="en-GB"/>
           </a:p>
@@ -1416,7 +1417,7 @@
           <a:p>
             <a:fld id="{F50A9E13-E3E1-4A58-855D-9850BB79EC8F}" type="datetimeFigureOut">
               <a:rPr lang="en-GB" smtClean="0"/>
-              <a:t>23/05/2023</a:t>
+              <a:t>24/05/2023</a:t>
             </a:fld>
             <a:endParaRPr lang="en-GB"/>
           </a:p>
@@ -1831,7 +1832,7 @@
           <a:p>
             <a:fld id="{F50A9E13-E3E1-4A58-855D-9850BB79EC8F}" type="datetimeFigureOut">
               <a:rPr lang="en-GB" smtClean="0"/>
-              <a:t>23/05/2023</a:t>
+              <a:t>24/05/2023</a:t>
             </a:fld>
             <a:endParaRPr lang="en-GB"/>
           </a:p>
@@ -1973,7 +1974,7 @@
           <a:p>
             <a:fld id="{F50A9E13-E3E1-4A58-855D-9850BB79EC8F}" type="datetimeFigureOut">
               <a:rPr lang="en-GB" smtClean="0"/>
-              <a:t>23/05/2023</a:t>
+              <a:t>24/05/2023</a:t>
             </a:fld>
             <a:endParaRPr lang="en-GB"/>
           </a:p>
@@ -2086,7 +2087,7 @@
           <a:p>
             <a:fld id="{F50A9E13-E3E1-4A58-855D-9850BB79EC8F}" type="datetimeFigureOut">
               <a:rPr lang="en-GB" smtClean="0"/>
-              <a:t>23/05/2023</a:t>
+              <a:t>24/05/2023</a:t>
             </a:fld>
             <a:endParaRPr lang="en-GB"/>
           </a:p>
@@ -2399,7 +2400,7 @@
           <a:p>
             <a:fld id="{F50A9E13-E3E1-4A58-855D-9850BB79EC8F}" type="datetimeFigureOut">
               <a:rPr lang="en-GB" smtClean="0"/>
-              <a:t>23/05/2023</a:t>
+              <a:t>24/05/2023</a:t>
             </a:fld>
             <a:endParaRPr lang="en-GB"/>
           </a:p>
@@ -2688,7 +2689,7 @@
           <a:p>
             <a:fld id="{F50A9E13-E3E1-4A58-855D-9850BB79EC8F}" type="datetimeFigureOut">
               <a:rPr lang="en-GB" smtClean="0"/>
-              <a:t>23/05/2023</a:t>
+              <a:t>24/05/2023</a:t>
             </a:fld>
             <a:endParaRPr lang="en-GB"/>
           </a:p>
@@ -2931,7 +2932,7 @@
           <a:p>
             <a:fld id="{F50A9E13-E3E1-4A58-855D-9850BB79EC8F}" type="datetimeFigureOut">
               <a:rPr lang="en-GB" smtClean="0"/>
-              <a:t>23/05/2023</a:t>
+              <a:t>24/05/2023</a:t>
             </a:fld>
             <a:endParaRPr lang="en-GB"/>
           </a:p>
@@ -6262,6 +6263,696 @@
           <p:cNvPr id="4" name="Rectangle 3">
             <a:extLst>
               <a:ext uri="{FF2B5EF4-FFF2-40B4-BE49-F238E27FC236}">
+                <a16:creationId xmlns:a16="http://schemas.microsoft.com/office/drawing/2014/main" id="{6DFFFCAA-B7F5-3261-A641-832AFDC927E6}"/>
+              </a:ext>
+            </a:extLst>
+          </p:cNvPr>
+          <p:cNvSpPr>
+            <a:spLocks noGrp="1" noRot="1" noMove="1" noResize="1" noEditPoints="1" noAdjustHandles="1" noChangeArrowheads="1" noChangeShapeType="1"/>
+          </p:cNvSpPr>
+          <p:nvPr/>
+        </p:nvSpPr>
+        <p:spPr>
+          <a:xfrm>
+            <a:off x="0" y="0"/>
+            <a:ext cx="12192000" cy="6858000"/>
+          </a:xfrm>
+          <a:prstGeom prst="rect">
+            <a:avLst/>
+          </a:prstGeom>
+        </p:spPr>
+        <p:style>
+          <a:lnRef idx="2">
+            <a:schemeClr val="accent1">
+              <a:shade val="50000"/>
+            </a:schemeClr>
+          </a:lnRef>
+          <a:fillRef idx="1">
+            <a:schemeClr val="accent1"/>
+          </a:fillRef>
+          <a:effectRef idx="0">
+            <a:schemeClr val="accent1"/>
+          </a:effectRef>
+          <a:fontRef idx="minor">
+            <a:schemeClr val="lt1"/>
+          </a:fontRef>
+        </p:style>
+        <p:txBody>
+          <a:bodyPr rtlCol="0" anchor="ctr"/>
+          <a:lstStyle/>
+          <a:p>
+            <a:pPr algn="ctr"/>
+            <a:endParaRPr lang="en-GB" dirty="0"/>
+          </a:p>
+        </p:txBody>
+      </p:sp>
+      <p:grpSp>
+        <p:nvGrpSpPr>
+          <p:cNvPr id="19" name="Group 18">
+            <a:extLst>
+              <a:ext uri="{FF2B5EF4-FFF2-40B4-BE49-F238E27FC236}">
+                <a16:creationId xmlns:a16="http://schemas.microsoft.com/office/drawing/2014/main" id="{B3FEF08A-0CB5-5E92-AEDF-2E0868788F59}"/>
+              </a:ext>
+            </a:extLst>
+          </p:cNvPr>
+          <p:cNvGrpSpPr/>
+          <p:nvPr/>
+        </p:nvGrpSpPr>
+        <p:grpSpPr>
+          <a:xfrm>
+            <a:off x="1058736" y="333569"/>
+            <a:ext cx="8430496" cy="4568081"/>
+            <a:chOff x="1058736" y="333569"/>
+            <a:chExt cx="8430496" cy="4568081"/>
+          </a:xfrm>
+        </p:grpSpPr>
+        <p:sp>
+          <p:nvSpPr>
+            <p:cNvPr id="18" name="Rectangle: Rounded Corners 17">
+              <a:extLst>
+                <a:ext uri="{FF2B5EF4-FFF2-40B4-BE49-F238E27FC236}">
+                  <a16:creationId xmlns:a16="http://schemas.microsoft.com/office/drawing/2014/main" id="{A162E6C4-724E-7CA9-A5E2-2C2FED0D8465}"/>
+                </a:ext>
+              </a:extLst>
+            </p:cNvPr>
+            <p:cNvSpPr/>
+            <p:nvPr/>
+          </p:nvSpPr>
+          <p:spPr>
+            <a:xfrm>
+              <a:off x="1254303" y="410689"/>
+              <a:ext cx="8234929" cy="4490961"/>
+            </a:xfrm>
+            <a:prstGeom prst="roundRect">
+              <a:avLst/>
+            </a:prstGeom>
+            <a:noFill/>
+            <a:ln w="127000">
+              <a:solidFill>
+                <a:srgbClr val="000000"/>
+              </a:solidFill>
+            </a:ln>
+          </p:spPr>
+          <p:style>
+            <a:lnRef idx="2">
+              <a:schemeClr val="accent1">
+                <a:shade val="50000"/>
+              </a:schemeClr>
+            </a:lnRef>
+            <a:fillRef idx="1">
+              <a:schemeClr val="accent1"/>
+            </a:fillRef>
+            <a:effectRef idx="0">
+              <a:schemeClr val="accent1"/>
+            </a:effectRef>
+            <a:fontRef idx="minor">
+              <a:schemeClr val="lt1"/>
+            </a:fontRef>
+          </p:style>
+          <p:txBody>
+            <a:bodyPr rtlCol="0" anchor="ctr"/>
+            <a:lstStyle/>
+            <a:p>
+              <a:pPr algn="ctr"/>
+              <a:endParaRPr lang="en-GB" dirty="0"/>
+            </a:p>
+          </p:txBody>
+        </p:sp>
+        <p:grpSp>
+          <p:nvGrpSpPr>
+            <p:cNvPr id="17" name="Group 16">
+              <a:extLst>
+                <a:ext uri="{FF2B5EF4-FFF2-40B4-BE49-F238E27FC236}">
+                  <a16:creationId xmlns:a16="http://schemas.microsoft.com/office/drawing/2014/main" id="{7DCA2AB0-BF85-D7AF-E3B2-4A8522F132F8}"/>
+                </a:ext>
+              </a:extLst>
+            </p:cNvPr>
+            <p:cNvGrpSpPr/>
+            <p:nvPr/>
+          </p:nvGrpSpPr>
+          <p:grpSpPr>
+            <a:xfrm>
+              <a:off x="1058736" y="333569"/>
+              <a:ext cx="8289371" cy="4458867"/>
+              <a:chOff x="1058736" y="333569"/>
+              <a:chExt cx="8289371" cy="4458867"/>
+            </a:xfrm>
+          </p:grpSpPr>
+          <p:grpSp>
+            <p:nvGrpSpPr>
+              <p:cNvPr id="12" name="Group 11">
+                <a:extLst>
+                  <a:ext uri="{FF2B5EF4-FFF2-40B4-BE49-F238E27FC236}">
+                    <a16:creationId xmlns:a16="http://schemas.microsoft.com/office/drawing/2014/main" id="{2DE8B24E-B109-B46D-95C1-CF0629D2F5D5}"/>
+                  </a:ext>
+                </a:extLst>
+              </p:cNvPr>
+              <p:cNvGrpSpPr/>
+              <p:nvPr/>
+            </p:nvGrpSpPr>
+            <p:grpSpPr>
+              <a:xfrm>
+                <a:off x="1306286" y="333569"/>
+                <a:ext cx="8041821" cy="4458867"/>
+                <a:chOff x="1306286" y="333569"/>
+                <a:chExt cx="8041821" cy="4458867"/>
+              </a:xfrm>
+            </p:grpSpPr>
+            <p:sp>
+              <p:nvSpPr>
+                <p:cNvPr id="11" name="Rectangle: Rounded Corners 10">
+                  <a:extLst>
+                    <a:ext uri="{FF2B5EF4-FFF2-40B4-BE49-F238E27FC236}">
+                      <a16:creationId xmlns:a16="http://schemas.microsoft.com/office/drawing/2014/main" id="{B614F1BD-14B5-816F-67EA-CA24C0D26FA4}"/>
+                    </a:ext>
+                  </a:extLst>
+                </p:cNvPr>
+                <p:cNvSpPr/>
+                <p:nvPr/>
+              </p:nvSpPr>
+              <p:spPr>
+                <a:xfrm>
+                  <a:off x="1306286" y="333569"/>
+                  <a:ext cx="8041821" cy="4359729"/>
+                </a:xfrm>
+                <a:prstGeom prst="roundRect">
+                  <a:avLst/>
+                </a:prstGeom>
+                <a:solidFill>
+                  <a:srgbClr val="C55A11"/>
+                </a:solidFill>
+                <a:ln w="254000">
+                  <a:noFill/>
+                </a:ln>
+              </p:spPr>
+              <p:style>
+                <a:lnRef idx="2">
+                  <a:schemeClr val="accent1">
+                    <a:shade val="50000"/>
+                  </a:schemeClr>
+                </a:lnRef>
+                <a:fillRef idx="1">
+                  <a:schemeClr val="accent1"/>
+                </a:fillRef>
+                <a:effectRef idx="0">
+                  <a:schemeClr val="accent1"/>
+                </a:effectRef>
+                <a:fontRef idx="minor">
+                  <a:schemeClr val="lt1"/>
+                </a:fontRef>
+              </p:style>
+              <p:txBody>
+                <a:bodyPr rtlCol="0" anchor="ctr"/>
+                <a:lstStyle/>
+                <a:p>
+                  <a:pPr algn="ctr"/>
+                  <a:endParaRPr lang="en-GB" dirty="0"/>
+                </a:p>
+              </p:txBody>
+            </p:sp>
+            <p:grpSp>
+              <p:nvGrpSpPr>
+                <p:cNvPr id="7" name="Group 6">
+                  <a:extLst>
+                    <a:ext uri="{FF2B5EF4-FFF2-40B4-BE49-F238E27FC236}">
+                      <a16:creationId xmlns:a16="http://schemas.microsoft.com/office/drawing/2014/main" id="{43229A67-939F-D573-8134-C30F30CA466A}"/>
+                    </a:ext>
+                  </a:extLst>
+                </p:cNvPr>
+                <p:cNvGrpSpPr/>
+                <p:nvPr/>
+              </p:nvGrpSpPr>
+              <p:grpSpPr>
+                <a:xfrm>
+                  <a:off x="1306286" y="432707"/>
+                  <a:ext cx="8041821" cy="4359729"/>
+                  <a:chOff x="1306286" y="432707"/>
+                  <a:chExt cx="8041821" cy="4359729"/>
+                </a:xfrm>
+                <a:noFill/>
+              </p:grpSpPr>
+              <p:sp>
+                <p:nvSpPr>
+                  <p:cNvPr id="5" name="Rectangle: Rounded Corners 4">
+                    <a:extLst>
+                      <a:ext uri="{FF2B5EF4-FFF2-40B4-BE49-F238E27FC236}">
+                        <a16:creationId xmlns:a16="http://schemas.microsoft.com/office/drawing/2014/main" id="{EEC1051B-9667-45D7-F18A-9BA8017E4983}"/>
+                      </a:ext>
+                    </a:extLst>
+                  </p:cNvPr>
+                  <p:cNvSpPr/>
+                  <p:nvPr/>
+                </p:nvSpPr>
+                <p:spPr>
+                  <a:xfrm>
+                    <a:off x="1306286" y="432707"/>
+                    <a:ext cx="8041821" cy="4359729"/>
+                  </a:xfrm>
+                  <a:prstGeom prst="roundRect">
+                    <a:avLst/>
+                  </a:prstGeom>
+                  <a:grpFill/>
+                  <a:ln w="254000">
+                    <a:solidFill>
+                      <a:srgbClr val="843C0C"/>
+                    </a:solidFill>
+                  </a:ln>
+                </p:spPr>
+                <p:style>
+                  <a:lnRef idx="2">
+                    <a:schemeClr val="accent1">
+                      <a:shade val="50000"/>
+                    </a:schemeClr>
+                  </a:lnRef>
+                  <a:fillRef idx="1">
+                    <a:schemeClr val="accent1"/>
+                  </a:fillRef>
+                  <a:effectRef idx="0">
+                    <a:schemeClr val="accent1"/>
+                  </a:effectRef>
+                  <a:fontRef idx="minor">
+                    <a:schemeClr val="lt1"/>
+                  </a:fontRef>
+                </p:style>
+                <p:txBody>
+                  <a:bodyPr rtlCol="0" anchor="ctr"/>
+                  <a:lstStyle/>
+                  <a:p>
+                    <a:pPr algn="ctr"/>
+                    <a:endParaRPr lang="en-GB" dirty="0"/>
+                  </a:p>
+                </p:txBody>
+              </p:sp>
+              <p:sp>
+                <p:nvSpPr>
+                  <p:cNvPr id="6" name="Rectangle: Rounded Corners 5">
+                    <a:extLst>
+                      <a:ext uri="{FF2B5EF4-FFF2-40B4-BE49-F238E27FC236}">
+                        <a16:creationId xmlns:a16="http://schemas.microsoft.com/office/drawing/2014/main" id="{71F12754-E168-A59F-FDF3-56E4F5BB3143}"/>
+                      </a:ext>
+                    </a:extLst>
+                  </p:cNvPr>
+                  <p:cNvSpPr/>
+                  <p:nvPr/>
+                </p:nvSpPr>
+                <p:spPr>
+                  <a:xfrm>
+                    <a:off x="1389093" y="531846"/>
+                    <a:ext cx="7876206" cy="4161452"/>
+                  </a:xfrm>
+                  <a:prstGeom prst="roundRect">
+                    <a:avLst/>
+                  </a:prstGeom>
+                  <a:grpFill/>
+                  <a:ln w="127000">
+                    <a:solidFill>
+                      <a:srgbClr val="74350A"/>
+                    </a:solidFill>
+                  </a:ln>
+                </p:spPr>
+                <p:style>
+                  <a:lnRef idx="2">
+                    <a:schemeClr val="accent1">
+                      <a:shade val="50000"/>
+                    </a:schemeClr>
+                  </a:lnRef>
+                  <a:fillRef idx="1">
+                    <a:schemeClr val="accent1"/>
+                  </a:fillRef>
+                  <a:effectRef idx="0">
+                    <a:schemeClr val="accent1"/>
+                  </a:effectRef>
+                  <a:fontRef idx="minor">
+                    <a:schemeClr val="lt1"/>
+                  </a:fontRef>
+                </p:style>
+                <p:txBody>
+                  <a:bodyPr rtlCol="0" anchor="ctr"/>
+                  <a:lstStyle/>
+                  <a:p>
+                    <a:pPr algn="ctr"/>
+                    <a:endParaRPr lang="en-GB" dirty="0"/>
+                  </a:p>
+                </p:txBody>
+              </p:sp>
+            </p:grpSp>
+          </p:grpSp>
+          <p:cxnSp>
+            <p:nvCxnSpPr>
+              <p:cNvPr id="14" name="Straight Connector 13">
+                <a:extLst>
+                  <a:ext uri="{FF2B5EF4-FFF2-40B4-BE49-F238E27FC236}">
+                    <a16:creationId xmlns:a16="http://schemas.microsoft.com/office/drawing/2014/main" id="{C82E2087-CDD4-D13F-B439-C585441A71D1}"/>
+                  </a:ext>
+                </a:extLst>
+              </p:cNvPr>
+              <p:cNvCxnSpPr>
+                <a:cxnSpLocks/>
+              </p:cNvCxnSpPr>
+              <p:nvPr/>
+            </p:nvCxnSpPr>
+            <p:spPr>
+              <a:xfrm>
+                <a:off x="2103061" y="382696"/>
+                <a:ext cx="3905854" cy="0"/>
+              </a:xfrm>
+              <a:prstGeom prst="line">
+                <a:avLst/>
+              </a:prstGeom>
+              <a:solidFill>
+                <a:srgbClr val="F1D8C6">
+                  <a:alpha val="80000"/>
+                </a:srgbClr>
+              </a:solidFill>
+              <a:ln w="152400">
+                <a:gradFill flip="none" rotWithShape="1">
+                  <a:gsLst>
+                    <a:gs pos="0">
+                      <a:srgbClr val="F1D8C6"/>
+                    </a:gs>
+                    <a:gs pos="88000">
+                      <a:srgbClr val="843C0C"/>
+                    </a:gs>
+                  </a:gsLst>
+                  <a:lin ang="0" scaled="1"/>
+                  <a:tileRect/>
+                </a:gradFill>
+              </a:ln>
+              <a:effectLst/>
+            </p:spPr>
+            <p:style>
+              <a:lnRef idx="1">
+                <a:schemeClr val="accent1"/>
+              </a:lnRef>
+              <a:fillRef idx="0">
+                <a:schemeClr val="accent1"/>
+              </a:fillRef>
+              <a:effectRef idx="0">
+                <a:schemeClr val="accent1"/>
+              </a:effectRef>
+              <a:fontRef idx="minor">
+                <a:schemeClr val="tx1"/>
+              </a:fontRef>
+            </p:style>
+          </p:cxnSp>
+          <p:sp>
+            <p:nvSpPr>
+              <p:cNvPr id="13" name="Chord 9">
+                <a:extLst>
+                  <a:ext uri="{FF2B5EF4-FFF2-40B4-BE49-F238E27FC236}">
+                    <a16:creationId xmlns:a16="http://schemas.microsoft.com/office/drawing/2014/main" id="{C4D5401B-A7FC-4C8C-6658-2035C03832C9}"/>
+                  </a:ext>
+                </a:extLst>
+              </p:cNvPr>
+              <p:cNvSpPr/>
+              <p:nvPr/>
+            </p:nvSpPr>
+            <p:spPr>
+              <a:xfrm rot="4261369">
+                <a:off x="1496640" y="-64989"/>
+                <a:ext cx="570833" cy="1446642"/>
+              </a:xfrm>
+              <a:custGeom>
+                <a:avLst/>
+                <a:gdLst>
+                  <a:gd name="connsiteX0" fmla="*/ 175910 w 444680"/>
+                  <a:gd name="connsiteY0" fmla="*/ 388062 h 392387"/>
+                  <a:gd name="connsiteX1" fmla="*/ 8875 w 444680"/>
+                  <a:gd name="connsiteY1" fmla="*/ 251073 h 392387"/>
+                  <a:gd name="connsiteX2" fmla="*/ 82723 w 444680"/>
+                  <a:gd name="connsiteY2" fmla="*/ 43504 h 392387"/>
+                  <a:gd name="connsiteX3" fmla="*/ 175910 w 444680"/>
+                  <a:gd name="connsiteY3" fmla="*/ 388062 h 392387"/>
+                  <a:gd name="connsiteX0" fmla="*/ 175920 w 175920"/>
+                  <a:gd name="connsiteY0" fmla="*/ 344558 h 344558"/>
+                  <a:gd name="connsiteX1" fmla="*/ 8885 w 175920"/>
+                  <a:gd name="connsiteY1" fmla="*/ 207569 h 344558"/>
+                  <a:gd name="connsiteX2" fmla="*/ 82733 w 175920"/>
+                  <a:gd name="connsiteY2" fmla="*/ 0 h 344558"/>
+                  <a:gd name="connsiteX3" fmla="*/ 75635 w 175920"/>
+                  <a:gd name="connsiteY3" fmla="*/ 179040 h 344558"/>
+                  <a:gd name="connsiteX4" fmla="*/ 175920 w 175920"/>
+                  <a:gd name="connsiteY4" fmla="*/ 344558 h 344558"/>
+                  <a:gd name="connsiteX0" fmla="*/ 175920 w 175920"/>
+                  <a:gd name="connsiteY0" fmla="*/ 344558 h 344558"/>
+                  <a:gd name="connsiteX1" fmla="*/ 8885 w 175920"/>
+                  <a:gd name="connsiteY1" fmla="*/ 207569 h 344558"/>
+                  <a:gd name="connsiteX2" fmla="*/ 82733 w 175920"/>
+                  <a:gd name="connsiteY2" fmla="*/ 0 h 344558"/>
+                  <a:gd name="connsiteX3" fmla="*/ 72609 w 175920"/>
+                  <a:gd name="connsiteY3" fmla="*/ 180517 h 344558"/>
+                  <a:gd name="connsiteX4" fmla="*/ 175920 w 175920"/>
+                  <a:gd name="connsiteY4" fmla="*/ 344558 h 344558"/>
+                  <a:gd name="connsiteX0" fmla="*/ 175920 w 175920"/>
+                  <a:gd name="connsiteY0" fmla="*/ 344558 h 344558"/>
+                  <a:gd name="connsiteX1" fmla="*/ 8885 w 175920"/>
+                  <a:gd name="connsiteY1" fmla="*/ 207569 h 344558"/>
+                  <a:gd name="connsiteX2" fmla="*/ 82733 w 175920"/>
+                  <a:gd name="connsiteY2" fmla="*/ 0 h 344558"/>
+                  <a:gd name="connsiteX3" fmla="*/ 72609 w 175920"/>
+                  <a:gd name="connsiteY3" fmla="*/ 180517 h 344558"/>
+                  <a:gd name="connsiteX4" fmla="*/ 175920 w 175920"/>
+                  <a:gd name="connsiteY4" fmla="*/ 344558 h 344558"/>
+                  <a:gd name="connsiteX0" fmla="*/ 175920 w 175920"/>
+                  <a:gd name="connsiteY0" fmla="*/ 344558 h 344558"/>
+                  <a:gd name="connsiteX1" fmla="*/ 8885 w 175920"/>
+                  <a:gd name="connsiteY1" fmla="*/ 207569 h 344558"/>
+                  <a:gd name="connsiteX2" fmla="*/ 82733 w 175920"/>
+                  <a:gd name="connsiteY2" fmla="*/ 0 h 344558"/>
+                  <a:gd name="connsiteX3" fmla="*/ 72609 w 175920"/>
+                  <a:gd name="connsiteY3" fmla="*/ 180517 h 344558"/>
+                  <a:gd name="connsiteX4" fmla="*/ 175920 w 175920"/>
+                  <a:gd name="connsiteY4" fmla="*/ 344558 h 344558"/>
+                  <a:gd name="connsiteX0" fmla="*/ 175920 w 175920"/>
+                  <a:gd name="connsiteY0" fmla="*/ 344558 h 344558"/>
+                  <a:gd name="connsiteX1" fmla="*/ 8885 w 175920"/>
+                  <a:gd name="connsiteY1" fmla="*/ 207569 h 344558"/>
+                  <a:gd name="connsiteX2" fmla="*/ 82733 w 175920"/>
+                  <a:gd name="connsiteY2" fmla="*/ 0 h 344558"/>
+                  <a:gd name="connsiteX3" fmla="*/ 54451 w 175920"/>
+                  <a:gd name="connsiteY3" fmla="*/ 189383 h 344558"/>
+                  <a:gd name="connsiteX4" fmla="*/ 175920 w 175920"/>
+                  <a:gd name="connsiteY4" fmla="*/ 344558 h 344558"/>
+                </a:gdLst>
+                <a:ahLst/>
+                <a:cxnLst>
+                  <a:cxn ang="0">
+                    <a:pos x="connsiteX0" y="connsiteY0"/>
+                  </a:cxn>
+                  <a:cxn ang="0">
+                    <a:pos x="connsiteX1" y="connsiteY1"/>
+                  </a:cxn>
+                  <a:cxn ang="0">
+                    <a:pos x="connsiteX2" y="connsiteY2"/>
+                  </a:cxn>
+                  <a:cxn ang="0">
+                    <a:pos x="connsiteX3" y="connsiteY3"/>
+                  </a:cxn>
+                  <a:cxn ang="0">
+                    <a:pos x="connsiteX4" y="connsiteY4"/>
+                  </a:cxn>
+                </a:cxnLst>
+                <a:rect l="l" t="t" r="r" b="b"/>
+                <a:pathLst>
+                  <a:path w="175920" h="344558">
+                    <a:moveTo>
+                      <a:pt x="175920" y="344558"/>
+                    </a:moveTo>
+                    <a:cubicBezTo>
+                      <a:pt x="95923" y="329485"/>
+                      <a:pt x="31766" y="276868"/>
+                      <a:pt x="8885" y="207569"/>
+                    </a:cubicBezTo>
+                    <a:cubicBezTo>
+                      <a:pt x="-16208" y="131569"/>
+                      <a:pt x="12916" y="49707"/>
+                      <a:pt x="82733" y="0"/>
+                    </a:cubicBezTo>
+                    <a:cubicBezTo>
+                      <a:pt x="97444" y="58838"/>
+                      <a:pt x="13492" y="119001"/>
+                      <a:pt x="54451" y="189383"/>
+                    </a:cubicBezTo>
+                    <a:cubicBezTo>
+                      <a:pt x="48141" y="252714"/>
+                      <a:pt x="159569" y="288543"/>
+                      <a:pt x="175920" y="344558"/>
+                    </a:cubicBezTo>
+                    <a:close/>
+                  </a:path>
+                </a:pathLst>
+              </a:custGeom>
+              <a:solidFill>
+                <a:srgbClr val="F1D8C6"/>
+              </a:solidFill>
+              <a:ln>
+                <a:noFill/>
+              </a:ln>
+            </p:spPr>
+            <p:style>
+              <a:lnRef idx="2">
+                <a:schemeClr val="accent1">
+                  <a:shade val="50000"/>
+                </a:schemeClr>
+              </a:lnRef>
+              <a:fillRef idx="1">
+                <a:schemeClr val="accent1"/>
+              </a:fillRef>
+              <a:effectRef idx="0">
+                <a:schemeClr val="accent1"/>
+              </a:effectRef>
+              <a:fontRef idx="minor">
+                <a:schemeClr val="lt1"/>
+              </a:fontRef>
+            </p:style>
+            <p:txBody>
+              <a:bodyPr rtlCol="0" anchor="ctr"/>
+              <a:lstStyle/>
+              <a:p>
+                <a:pPr algn="ctr"/>
+                <a:endParaRPr lang="en-GB" dirty="0"/>
+              </a:p>
+            </p:txBody>
+          </p:sp>
+          <p:cxnSp>
+            <p:nvCxnSpPr>
+              <p:cNvPr id="15" name="Straight Connector 14">
+                <a:extLst>
+                  <a:ext uri="{FF2B5EF4-FFF2-40B4-BE49-F238E27FC236}">
+                    <a16:creationId xmlns:a16="http://schemas.microsoft.com/office/drawing/2014/main" id="{DE6D9541-D760-BA79-5290-D654866FD7B0}"/>
+                  </a:ext>
+                </a:extLst>
+              </p:cNvPr>
+              <p:cNvCxnSpPr>
+                <a:cxnSpLocks/>
+              </p:cNvCxnSpPr>
+              <p:nvPr/>
+            </p:nvCxnSpPr>
+            <p:spPr>
+              <a:xfrm>
+                <a:off x="1254304" y="1001306"/>
+                <a:ext cx="0" cy="1426429"/>
+              </a:xfrm>
+              <a:prstGeom prst="line">
+                <a:avLst/>
+              </a:prstGeom>
+              <a:solidFill>
+                <a:srgbClr val="F1D8C6">
+                  <a:alpha val="80000"/>
+                </a:srgbClr>
+              </a:solidFill>
+              <a:ln w="139700">
+                <a:gradFill flip="none" rotWithShape="1">
+                  <a:gsLst>
+                    <a:gs pos="0">
+                      <a:srgbClr val="F1D8C6"/>
+                    </a:gs>
+                    <a:gs pos="81000">
+                      <a:srgbClr val="843C0C"/>
+                    </a:gs>
+                  </a:gsLst>
+                  <a:lin ang="5400000" scaled="1"/>
+                  <a:tileRect/>
+                </a:gradFill>
+              </a:ln>
+            </p:spPr>
+            <p:style>
+              <a:lnRef idx="1">
+                <a:schemeClr val="accent1"/>
+              </a:lnRef>
+              <a:fillRef idx="0">
+                <a:schemeClr val="accent1"/>
+              </a:fillRef>
+              <a:effectRef idx="0">
+                <a:schemeClr val="accent1"/>
+              </a:effectRef>
+              <a:fontRef idx="minor">
+                <a:schemeClr val="tx1"/>
+              </a:fontRef>
+            </p:style>
+          </p:cxnSp>
+        </p:grpSp>
+      </p:grpSp>
+      <p:pic>
+        <p:nvPicPr>
+          <p:cNvPr id="21" name="Picture 20" descr="A picture containing screenshot, orange, design&#10;&#10;Description automatically generated">
+            <a:extLst>
+              <a:ext uri="{FF2B5EF4-FFF2-40B4-BE49-F238E27FC236}">
+                <a16:creationId xmlns:a16="http://schemas.microsoft.com/office/drawing/2014/main" id="{C2F907E7-9C42-9229-D702-B41E43795791}"/>
+              </a:ext>
+            </a:extLst>
+          </p:cNvPr>
+          <p:cNvPicPr>
+            <a:picLocks noChangeAspect="1"/>
+          </p:cNvPicPr>
+          <p:nvPr/>
+        </p:nvPicPr>
+        <p:blipFill>
+          <a:blip r:embed="rId2">
+            <a:extLst>
+              <a:ext uri="{BEBA8EAE-BF5A-486C-A8C5-ECC9F3942E4B}">
+                <a14:imgProps xmlns:a14="http://schemas.microsoft.com/office/drawing/2010/main">
+                  <a14:imgLayer r:embed="rId3">
+                    <a14:imgEffect>
+                      <a14:brightnessContrast contrast="-20000"/>
+                    </a14:imgEffect>
+                  </a14:imgLayer>
+                </a14:imgProps>
+              </a:ext>
+              <a:ext uri="{28A0092B-C50C-407E-A947-70E740481C1C}">
+                <a14:useLocalDpi xmlns:a14="http://schemas.microsoft.com/office/drawing/2010/main" val="0"/>
+              </a:ext>
+            </a:extLst>
+          </a:blip>
+          <a:stretch>
+            <a:fillRect/>
+          </a:stretch>
+        </p:blipFill>
+        <p:spPr>
+          <a:xfrm>
+            <a:off x="1352208" y="282214"/>
+            <a:ext cx="8376540" cy="4660714"/>
+          </a:xfrm>
+          <a:prstGeom prst="rect">
+            <a:avLst/>
+          </a:prstGeom>
+        </p:spPr>
+      </p:pic>
+    </p:spTree>
+    <p:extLst>
+      <p:ext uri="{BB962C8B-B14F-4D97-AF65-F5344CB8AC3E}">
+        <p14:creationId xmlns:p14="http://schemas.microsoft.com/office/powerpoint/2010/main" val="1991345402"/>
+      </p:ext>
+    </p:extLst>
+  </p:cSld>
+  <p:clrMapOvr>
+    <a:masterClrMapping/>
+  </p:clrMapOvr>
+</p:sld>
+</file>
+
+<file path=ppt/slides/slide3.xml><?xml version="1.0" encoding="utf-8"?>
+<p:sld xmlns:a="http://schemas.openxmlformats.org/drawingml/2006/main" xmlns:r="http://schemas.openxmlformats.org/officeDocument/2006/relationships" xmlns:p="http://schemas.openxmlformats.org/presentationml/2006/main">
+  <p:cSld>
+    <p:spTree>
+      <p:nvGrpSpPr>
+        <p:cNvPr id="1" name=""/>
+        <p:cNvGrpSpPr/>
+        <p:nvPr/>
+      </p:nvGrpSpPr>
+      <p:grpSpPr>
+        <a:xfrm>
+          <a:off x="0" y="0"/>
+          <a:ext cx="0" cy="0"/>
+          <a:chOff x="0" y="0"/>
+          <a:chExt cx="0" cy="0"/>
+        </a:xfrm>
+      </p:grpSpPr>
+      <p:sp>
+        <p:nvSpPr>
+          <p:cNvPr id="4" name="Rectangle 3">
+            <a:extLst>
+              <a:ext uri="{FF2B5EF4-FFF2-40B4-BE49-F238E27FC236}">
                 <a16:creationId xmlns:a16="http://schemas.microsoft.com/office/drawing/2014/main" id="{E0F4465E-5A16-266F-F2FC-A821F8649151}"/>
               </a:ext>
             </a:extLst>
@@ -9608,6 +10299,1630 @@
           </p:style>
         </p:cxnSp>
       </p:grpSp>
+      <p:grpSp>
+        <p:nvGrpSpPr>
+          <p:cNvPr id="2" name="Group 1">
+            <a:extLst>
+              <a:ext uri="{FF2B5EF4-FFF2-40B4-BE49-F238E27FC236}">
+                <a16:creationId xmlns:a16="http://schemas.microsoft.com/office/drawing/2014/main" id="{D13AE3D1-4DBE-A7B0-60E0-47195799F20E}"/>
+              </a:ext>
+            </a:extLst>
+          </p:cNvPr>
+          <p:cNvGrpSpPr/>
+          <p:nvPr/>
+        </p:nvGrpSpPr>
+        <p:grpSpPr>
+          <a:xfrm>
+            <a:off x="6163342" y="1065517"/>
+            <a:ext cx="2029994" cy="987877"/>
+            <a:chOff x="816213" y="871448"/>
+            <a:chExt cx="2029994" cy="987877"/>
+          </a:xfrm>
+        </p:grpSpPr>
+        <p:grpSp>
+          <p:nvGrpSpPr>
+            <p:cNvPr id="3" name="Group 2">
+              <a:extLst>
+                <a:ext uri="{FF2B5EF4-FFF2-40B4-BE49-F238E27FC236}">
+                  <a16:creationId xmlns:a16="http://schemas.microsoft.com/office/drawing/2014/main" id="{99473D02-56B2-53B8-D32A-06FEBC32A21E}"/>
+                </a:ext>
+              </a:extLst>
+            </p:cNvPr>
+            <p:cNvGrpSpPr/>
+            <p:nvPr/>
+          </p:nvGrpSpPr>
+          <p:grpSpPr>
+            <a:xfrm>
+              <a:off x="816213" y="871448"/>
+              <a:ext cx="2029994" cy="987877"/>
+              <a:chOff x="610473" y="666072"/>
+              <a:chExt cx="2029994" cy="987877"/>
+            </a:xfrm>
+          </p:grpSpPr>
+          <p:sp>
+            <p:nvSpPr>
+              <p:cNvPr id="12" name="Rectangle: Rounded Corners 11">
+                <a:extLst>
+                  <a:ext uri="{FF2B5EF4-FFF2-40B4-BE49-F238E27FC236}">
+                    <a16:creationId xmlns:a16="http://schemas.microsoft.com/office/drawing/2014/main" id="{5AADDF61-0121-86BE-CECE-1CA39D6648AF}"/>
+                  </a:ext>
+                </a:extLst>
+              </p:cNvPr>
+              <p:cNvSpPr/>
+              <p:nvPr/>
+            </p:nvSpPr>
+            <p:spPr>
+              <a:xfrm>
+                <a:off x="648382" y="666072"/>
+                <a:ext cx="1992085" cy="987877"/>
+              </a:xfrm>
+              <a:prstGeom prst="roundRect">
+                <a:avLst/>
+              </a:prstGeom>
+              <a:solidFill>
+                <a:schemeClr val="tx1">
+                  <a:lumMod val="95000"/>
+                  <a:lumOff val="5000"/>
+                </a:schemeClr>
+              </a:solidFill>
+              <a:ln>
+                <a:noFill/>
+              </a:ln>
+            </p:spPr>
+            <p:style>
+              <a:lnRef idx="2">
+                <a:schemeClr val="accent1">
+                  <a:shade val="50000"/>
+                </a:schemeClr>
+              </a:lnRef>
+              <a:fillRef idx="1">
+                <a:schemeClr val="accent1"/>
+              </a:fillRef>
+              <a:effectRef idx="0">
+                <a:schemeClr val="accent1"/>
+              </a:effectRef>
+              <a:fontRef idx="minor">
+                <a:schemeClr val="lt1"/>
+              </a:fontRef>
+            </p:style>
+            <p:txBody>
+              <a:bodyPr rtlCol="0" anchor="ctr"/>
+              <a:lstStyle/>
+              <a:p>
+                <a:pPr algn="ctr"/>
+                <a:endParaRPr lang="en-GB"/>
+              </a:p>
+            </p:txBody>
+          </p:sp>
+          <p:sp>
+            <p:nvSpPr>
+              <p:cNvPr id="13" name="Rectangle: Rounded Corners 12">
+                <a:extLst>
+                  <a:ext uri="{FF2B5EF4-FFF2-40B4-BE49-F238E27FC236}">
+                    <a16:creationId xmlns:a16="http://schemas.microsoft.com/office/drawing/2014/main" id="{204E8179-99C2-2355-FF86-A3C399984040}"/>
+                  </a:ext>
+                </a:extLst>
+              </p:cNvPr>
+              <p:cNvSpPr/>
+              <p:nvPr/>
+            </p:nvSpPr>
+            <p:spPr>
+              <a:xfrm>
+                <a:off x="656546" y="674236"/>
+                <a:ext cx="1951264" cy="955221"/>
+              </a:xfrm>
+              <a:prstGeom prst="roundRect">
+                <a:avLst/>
+              </a:prstGeom>
+              <a:solidFill>
+                <a:srgbClr val="843C0C"/>
+              </a:solidFill>
+              <a:ln>
+                <a:noFill/>
+              </a:ln>
+            </p:spPr>
+            <p:style>
+              <a:lnRef idx="2">
+                <a:schemeClr val="accent1">
+                  <a:shade val="50000"/>
+                </a:schemeClr>
+              </a:lnRef>
+              <a:fillRef idx="1">
+                <a:schemeClr val="accent1"/>
+              </a:fillRef>
+              <a:effectRef idx="0">
+                <a:schemeClr val="accent1"/>
+              </a:effectRef>
+              <a:fontRef idx="minor">
+                <a:schemeClr val="lt1"/>
+              </a:fontRef>
+            </p:style>
+            <p:txBody>
+              <a:bodyPr rtlCol="0" anchor="ctr"/>
+              <a:lstStyle/>
+              <a:p>
+                <a:pPr algn="ctr"/>
+                <a:endParaRPr lang="en-GB"/>
+              </a:p>
+            </p:txBody>
+          </p:sp>
+          <p:sp>
+            <p:nvSpPr>
+              <p:cNvPr id="15" name="Rectangle: Rounded Corners 14">
+                <a:extLst>
+                  <a:ext uri="{FF2B5EF4-FFF2-40B4-BE49-F238E27FC236}">
+                    <a16:creationId xmlns:a16="http://schemas.microsoft.com/office/drawing/2014/main" id="{25FD65C6-5C71-47E4-A33C-7833A09F38D8}"/>
+                  </a:ext>
+                </a:extLst>
+              </p:cNvPr>
+              <p:cNvSpPr/>
+              <p:nvPr/>
+            </p:nvSpPr>
+            <p:spPr>
+              <a:xfrm>
+                <a:off x="648382" y="666072"/>
+                <a:ext cx="1902278" cy="898069"/>
+              </a:xfrm>
+              <a:prstGeom prst="roundRect">
+                <a:avLst/>
+              </a:prstGeom>
+              <a:solidFill>
+                <a:srgbClr val="C55A11"/>
+              </a:solidFill>
+              <a:ln>
+                <a:noFill/>
+              </a:ln>
+            </p:spPr>
+            <p:style>
+              <a:lnRef idx="2">
+                <a:schemeClr val="accent1">
+                  <a:shade val="50000"/>
+                </a:schemeClr>
+              </a:lnRef>
+              <a:fillRef idx="1">
+                <a:schemeClr val="accent1"/>
+              </a:fillRef>
+              <a:effectRef idx="0">
+                <a:schemeClr val="accent1"/>
+              </a:effectRef>
+              <a:fontRef idx="minor">
+                <a:schemeClr val="lt1"/>
+              </a:fontRef>
+            </p:style>
+            <p:txBody>
+              <a:bodyPr rtlCol="0" anchor="ctr"/>
+              <a:lstStyle/>
+              <a:p>
+                <a:pPr algn="ctr"/>
+                <a:r>
+                  <a:rPr lang="en-GB" sz="2650" dirty="0">
+                    <a:latin typeface="Harlow Solid Italic" panose="04030604020F02020D02" pitchFamily="82" charset="0"/>
+                  </a:rPr>
+                  <a:t>A Pat on the Back</a:t>
+                </a:r>
+              </a:p>
+            </p:txBody>
+          </p:sp>
+          <p:sp>
+            <p:nvSpPr>
+              <p:cNvPr id="17" name="Chord 9">
+                <a:extLst>
+                  <a:ext uri="{FF2B5EF4-FFF2-40B4-BE49-F238E27FC236}">
+                    <a16:creationId xmlns:a16="http://schemas.microsoft.com/office/drawing/2014/main" id="{220B20CA-6D0E-0323-5097-B0C43E55C8FB}"/>
+                  </a:ext>
+                </a:extLst>
+              </p:cNvPr>
+              <p:cNvSpPr/>
+              <p:nvPr/>
+            </p:nvSpPr>
+            <p:spPr>
+              <a:xfrm rot="4261369">
+                <a:off x="694792" y="587271"/>
+                <a:ext cx="175920" cy="344558"/>
+              </a:xfrm>
+              <a:custGeom>
+                <a:avLst/>
+                <a:gdLst>
+                  <a:gd name="connsiteX0" fmla="*/ 175910 w 444680"/>
+                  <a:gd name="connsiteY0" fmla="*/ 388062 h 392387"/>
+                  <a:gd name="connsiteX1" fmla="*/ 8875 w 444680"/>
+                  <a:gd name="connsiteY1" fmla="*/ 251073 h 392387"/>
+                  <a:gd name="connsiteX2" fmla="*/ 82723 w 444680"/>
+                  <a:gd name="connsiteY2" fmla="*/ 43504 h 392387"/>
+                  <a:gd name="connsiteX3" fmla="*/ 175910 w 444680"/>
+                  <a:gd name="connsiteY3" fmla="*/ 388062 h 392387"/>
+                  <a:gd name="connsiteX0" fmla="*/ 175920 w 175920"/>
+                  <a:gd name="connsiteY0" fmla="*/ 344558 h 344558"/>
+                  <a:gd name="connsiteX1" fmla="*/ 8885 w 175920"/>
+                  <a:gd name="connsiteY1" fmla="*/ 207569 h 344558"/>
+                  <a:gd name="connsiteX2" fmla="*/ 82733 w 175920"/>
+                  <a:gd name="connsiteY2" fmla="*/ 0 h 344558"/>
+                  <a:gd name="connsiteX3" fmla="*/ 75635 w 175920"/>
+                  <a:gd name="connsiteY3" fmla="*/ 179040 h 344558"/>
+                  <a:gd name="connsiteX4" fmla="*/ 175920 w 175920"/>
+                  <a:gd name="connsiteY4" fmla="*/ 344558 h 344558"/>
+                  <a:gd name="connsiteX0" fmla="*/ 175920 w 175920"/>
+                  <a:gd name="connsiteY0" fmla="*/ 344558 h 344558"/>
+                  <a:gd name="connsiteX1" fmla="*/ 8885 w 175920"/>
+                  <a:gd name="connsiteY1" fmla="*/ 207569 h 344558"/>
+                  <a:gd name="connsiteX2" fmla="*/ 82733 w 175920"/>
+                  <a:gd name="connsiteY2" fmla="*/ 0 h 344558"/>
+                  <a:gd name="connsiteX3" fmla="*/ 72609 w 175920"/>
+                  <a:gd name="connsiteY3" fmla="*/ 180517 h 344558"/>
+                  <a:gd name="connsiteX4" fmla="*/ 175920 w 175920"/>
+                  <a:gd name="connsiteY4" fmla="*/ 344558 h 344558"/>
+                  <a:gd name="connsiteX0" fmla="*/ 175920 w 175920"/>
+                  <a:gd name="connsiteY0" fmla="*/ 344558 h 344558"/>
+                  <a:gd name="connsiteX1" fmla="*/ 8885 w 175920"/>
+                  <a:gd name="connsiteY1" fmla="*/ 207569 h 344558"/>
+                  <a:gd name="connsiteX2" fmla="*/ 82733 w 175920"/>
+                  <a:gd name="connsiteY2" fmla="*/ 0 h 344558"/>
+                  <a:gd name="connsiteX3" fmla="*/ 72609 w 175920"/>
+                  <a:gd name="connsiteY3" fmla="*/ 180517 h 344558"/>
+                  <a:gd name="connsiteX4" fmla="*/ 175920 w 175920"/>
+                  <a:gd name="connsiteY4" fmla="*/ 344558 h 344558"/>
+                  <a:gd name="connsiteX0" fmla="*/ 175920 w 175920"/>
+                  <a:gd name="connsiteY0" fmla="*/ 344558 h 344558"/>
+                  <a:gd name="connsiteX1" fmla="*/ 8885 w 175920"/>
+                  <a:gd name="connsiteY1" fmla="*/ 207569 h 344558"/>
+                  <a:gd name="connsiteX2" fmla="*/ 82733 w 175920"/>
+                  <a:gd name="connsiteY2" fmla="*/ 0 h 344558"/>
+                  <a:gd name="connsiteX3" fmla="*/ 72609 w 175920"/>
+                  <a:gd name="connsiteY3" fmla="*/ 180517 h 344558"/>
+                  <a:gd name="connsiteX4" fmla="*/ 175920 w 175920"/>
+                  <a:gd name="connsiteY4" fmla="*/ 344558 h 344558"/>
+                  <a:gd name="connsiteX0" fmla="*/ 175920 w 175920"/>
+                  <a:gd name="connsiteY0" fmla="*/ 344558 h 344558"/>
+                  <a:gd name="connsiteX1" fmla="*/ 8885 w 175920"/>
+                  <a:gd name="connsiteY1" fmla="*/ 207569 h 344558"/>
+                  <a:gd name="connsiteX2" fmla="*/ 82733 w 175920"/>
+                  <a:gd name="connsiteY2" fmla="*/ 0 h 344558"/>
+                  <a:gd name="connsiteX3" fmla="*/ 54451 w 175920"/>
+                  <a:gd name="connsiteY3" fmla="*/ 189383 h 344558"/>
+                  <a:gd name="connsiteX4" fmla="*/ 175920 w 175920"/>
+                  <a:gd name="connsiteY4" fmla="*/ 344558 h 344558"/>
+                </a:gdLst>
+                <a:ahLst/>
+                <a:cxnLst>
+                  <a:cxn ang="0">
+                    <a:pos x="connsiteX0" y="connsiteY0"/>
+                  </a:cxn>
+                  <a:cxn ang="0">
+                    <a:pos x="connsiteX1" y="connsiteY1"/>
+                  </a:cxn>
+                  <a:cxn ang="0">
+                    <a:pos x="connsiteX2" y="connsiteY2"/>
+                  </a:cxn>
+                  <a:cxn ang="0">
+                    <a:pos x="connsiteX3" y="connsiteY3"/>
+                  </a:cxn>
+                  <a:cxn ang="0">
+                    <a:pos x="connsiteX4" y="connsiteY4"/>
+                  </a:cxn>
+                </a:cxnLst>
+                <a:rect l="l" t="t" r="r" b="b"/>
+                <a:pathLst>
+                  <a:path w="175920" h="344558">
+                    <a:moveTo>
+                      <a:pt x="175920" y="344558"/>
+                    </a:moveTo>
+                    <a:cubicBezTo>
+                      <a:pt x="95923" y="329485"/>
+                      <a:pt x="31766" y="276868"/>
+                      <a:pt x="8885" y="207569"/>
+                    </a:cubicBezTo>
+                    <a:cubicBezTo>
+                      <a:pt x="-16208" y="131569"/>
+                      <a:pt x="12916" y="49707"/>
+                      <a:pt x="82733" y="0"/>
+                    </a:cubicBezTo>
+                    <a:cubicBezTo>
+                      <a:pt x="97444" y="58838"/>
+                      <a:pt x="13492" y="119001"/>
+                      <a:pt x="54451" y="189383"/>
+                    </a:cubicBezTo>
+                    <a:cubicBezTo>
+                      <a:pt x="48141" y="252714"/>
+                      <a:pt x="159569" y="288543"/>
+                      <a:pt x="175920" y="344558"/>
+                    </a:cubicBezTo>
+                    <a:close/>
+                  </a:path>
+                </a:pathLst>
+              </a:custGeom>
+              <a:solidFill>
+                <a:srgbClr val="FFFFFF">
+                  <a:alpha val="76078"/>
+                </a:srgbClr>
+              </a:solidFill>
+              <a:ln>
+                <a:noFill/>
+              </a:ln>
+            </p:spPr>
+            <p:style>
+              <a:lnRef idx="2">
+                <a:schemeClr val="accent1">
+                  <a:shade val="50000"/>
+                </a:schemeClr>
+              </a:lnRef>
+              <a:fillRef idx="1">
+                <a:schemeClr val="accent1"/>
+              </a:fillRef>
+              <a:effectRef idx="0">
+                <a:schemeClr val="accent1"/>
+              </a:effectRef>
+              <a:fontRef idx="minor">
+                <a:schemeClr val="lt1"/>
+              </a:fontRef>
+            </p:style>
+            <p:txBody>
+              <a:bodyPr rtlCol="0" anchor="ctr"/>
+              <a:lstStyle/>
+              <a:p>
+                <a:pPr algn="ctr"/>
+                <a:endParaRPr lang="en-GB" dirty="0"/>
+              </a:p>
+            </p:txBody>
+          </p:sp>
+        </p:grpSp>
+        <p:cxnSp>
+          <p:nvCxnSpPr>
+            <p:cNvPr id="8" name="Straight Connector 7">
+              <a:extLst>
+                <a:ext uri="{FF2B5EF4-FFF2-40B4-BE49-F238E27FC236}">
+                  <a16:creationId xmlns:a16="http://schemas.microsoft.com/office/drawing/2014/main" id="{C5919239-B294-60A0-ABE7-55A2A66DD304}"/>
+                </a:ext>
+              </a:extLst>
+            </p:cNvPr>
+            <p:cNvCxnSpPr>
+              <a:cxnSpLocks/>
+            </p:cNvCxnSpPr>
+            <p:nvPr/>
+          </p:nvCxnSpPr>
+          <p:spPr>
+            <a:xfrm>
+              <a:off x="1049696" y="893901"/>
+              <a:ext cx="1045804" cy="0"/>
+            </a:xfrm>
+            <a:prstGeom prst="line">
+              <a:avLst/>
+            </a:prstGeom>
+            <a:ln w="38100">
+              <a:solidFill>
+                <a:srgbClr val="F1D8C6"/>
+              </a:solidFill>
+            </a:ln>
+          </p:spPr>
+          <p:style>
+            <a:lnRef idx="1">
+              <a:schemeClr val="accent1"/>
+            </a:lnRef>
+            <a:fillRef idx="0">
+              <a:schemeClr val="accent1"/>
+            </a:fillRef>
+            <a:effectRef idx="0">
+              <a:schemeClr val="accent1"/>
+            </a:effectRef>
+            <a:fontRef idx="minor">
+              <a:schemeClr val="tx1"/>
+            </a:fontRef>
+          </p:style>
+        </p:cxnSp>
+        <p:cxnSp>
+          <p:nvCxnSpPr>
+            <p:cNvPr id="9" name="Straight Connector 8">
+              <a:extLst>
+                <a:ext uri="{FF2B5EF4-FFF2-40B4-BE49-F238E27FC236}">
+                  <a16:creationId xmlns:a16="http://schemas.microsoft.com/office/drawing/2014/main" id="{BA8F0DC5-31A1-2BDC-C793-2CF8262AF618}"/>
+                </a:ext>
+              </a:extLst>
+            </p:cNvPr>
+            <p:cNvCxnSpPr>
+              <a:cxnSpLocks/>
+            </p:cNvCxnSpPr>
+            <p:nvPr/>
+          </p:nvCxnSpPr>
+          <p:spPr>
+            <a:xfrm>
+              <a:off x="869906" y="1023441"/>
+              <a:ext cx="0" cy="439599"/>
+            </a:xfrm>
+            <a:prstGeom prst="line">
+              <a:avLst/>
+            </a:prstGeom>
+            <a:ln w="38100">
+              <a:solidFill>
+                <a:srgbClr val="F1D8C6"/>
+              </a:solidFill>
+            </a:ln>
+          </p:spPr>
+          <p:style>
+            <a:lnRef idx="1">
+              <a:schemeClr val="accent1"/>
+            </a:lnRef>
+            <a:fillRef idx="0">
+              <a:schemeClr val="accent1"/>
+            </a:fillRef>
+            <a:effectRef idx="0">
+              <a:schemeClr val="accent1"/>
+            </a:effectRef>
+            <a:fontRef idx="minor">
+              <a:schemeClr val="tx1"/>
+            </a:fontRef>
+          </p:style>
+        </p:cxnSp>
+      </p:grpSp>
+      <p:pic>
+        <p:nvPicPr>
+          <p:cNvPr id="70" name="Picture 69" descr="A picture containing text, font, screenshot, graphics&#10;&#10;Description automatically generated">
+            <a:extLst>
+              <a:ext uri="{FF2B5EF4-FFF2-40B4-BE49-F238E27FC236}">
+                <a16:creationId xmlns:a16="http://schemas.microsoft.com/office/drawing/2014/main" id="{0CD01E28-2DB9-3542-2B73-243378274AD0}"/>
+              </a:ext>
+            </a:extLst>
+          </p:cNvPr>
+          <p:cNvPicPr>
+            <a:picLocks noChangeAspect="1"/>
+          </p:cNvPicPr>
+          <p:nvPr/>
+        </p:nvPicPr>
+        <p:blipFill rotWithShape="1">
+          <a:blip r:embed="rId5">
+            <a:extLst>
+              <a:ext uri="{BEBA8EAE-BF5A-486C-A8C5-ECC9F3942E4B}">
+                <a14:imgProps xmlns:a14="http://schemas.microsoft.com/office/drawing/2010/main">
+                  <a14:imgLayer r:embed="rId6">
+                    <a14:imgEffect>
+                      <a14:brightnessContrast bright="40000" contrast="20000"/>
+                    </a14:imgEffect>
+                  </a14:imgLayer>
+                </a14:imgProps>
+              </a:ext>
+              <a:ext uri="{28A0092B-C50C-407E-A947-70E740481C1C}">
+                <a14:useLocalDpi xmlns:a14="http://schemas.microsoft.com/office/drawing/2010/main" val="0"/>
+              </a:ext>
+            </a:extLst>
+          </a:blip>
+          <a:srcRect l="2974" t="4883" r="2742" b="7057"/>
+          <a:stretch/>
+        </p:blipFill>
+        <p:spPr>
+          <a:xfrm>
+            <a:off x="4084555" y="1053951"/>
+            <a:ext cx="1990733" cy="983352"/>
+          </a:xfrm>
+          <a:prstGeom prst="rect">
+            <a:avLst/>
+          </a:prstGeom>
+        </p:spPr>
+      </p:pic>
+      <p:pic>
+        <p:nvPicPr>
+          <p:cNvPr id="71" name="Picture 70" descr="A picture containing text, font, screenshot, graphics&#10;&#10;Description automatically generated">
+            <a:extLst>
+              <a:ext uri="{FF2B5EF4-FFF2-40B4-BE49-F238E27FC236}">
+                <a16:creationId xmlns:a16="http://schemas.microsoft.com/office/drawing/2014/main" id="{CD925F7E-DE49-F76B-3083-8AAEF912FFD4}"/>
+              </a:ext>
+            </a:extLst>
+          </p:cNvPr>
+          <p:cNvPicPr>
+            <a:picLocks noChangeAspect="1"/>
+          </p:cNvPicPr>
+          <p:nvPr/>
+        </p:nvPicPr>
+        <p:blipFill rotWithShape="1">
+          <a:blip r:embed="rId7">
+            <a:extLst>
+              <a:ext uri="{BEBA8EAE-BF5A-486C-A8C5-ECC9F3942E4B}">
+                <a14:imgProps xmlns:a14="http://schemas.microsoft.com/office/drawing/2010/main">
+                  <a14:imgLayer r:embed="rId6">
+                    <a14:imgEffect>
+                      <a14:brightnessContrast bright="-20000" contrast="40000"/>
+                    </a14:imgEffect>
+                  </a14:imgLayer>
+                </a14:imgProps>
+              </a:ext>
+              <a:ext uri="{28A0092B-C50C-407E-A947-70E740481C1C}">
+                <a14:useLocalDpi xmlns:a14="http://schemas.microsoft.com/office/drawing/2010/main" val="0"/>
+              </a:ext>
+            </a:extLst>
+          </a:blip>
+          <a:srcRect l="2910" t="3872" r="2602" b="6838"/>
+          <a:stretch/>
+        </p:blipFill>
+        <p:spPr>
+          <a:xfrm>
+            <a:off x="2061710" y="1043986"/>
+            <a:ext cx="1995074" cy="997092"/>
+          </a:xfrm>
+          <a:prstGeom prst="rect">
+            <a:avLst/>
+          </a:prstGeom>
+        </p:spPr>
+      </p:pic>
+      <p:pic>
+        <p:nvPicPr>
+          <p:cNvPr id="73" name="Picture 72" descr="A picture containing text, font, screenshot, graphics&#10;&#10;Description automatically generated">
+            <a:extLst>
+              <a:ext uri="{FF2B5EF4-FFF2-40B4-BE49-F238E27FC236}">
+                <a16:creationId xmlns:a16="http://schemas.microsoft.com/office/drawing/2014/main" id="{F26A1437-0DB4-E743-C272-57F4EAF6A14D}"/>
+              </a:ext>
+            </a:extLst>
+          </p:cNvPr>
+          <p:cNvPicPr>
+            <a:picLocks noChangeAspect="1"/>
+          </p:cNvPicPr>
+          <p:nvPr/>
+        </p:nvPicPr>
+        <p:blipFill rotWithShape="1">
+          <a:blip r:embed="rId8">
+            <a:extLst>
+              <a:ext uri="{BEBA8EAE-BF5A-486C-A8C5-ECC9F3942E4B}">
+                <a14:imgProps xmlns:a14="http://schemas.microsoft.com/office/drawing/2010/main">
+                  <a14:imgLayer r:embed="rId9">
+                    <a14:imgEffect>
+                      <a14:brightnessContrast bright="40000" contrast="20000"/>
+                    </a14:imgEffect>
+                  </a14:imgLayer>
+                </a14:imgProps>
+              </a:ext>
+              <a:ext uri="{28A0092B-C50C-407E-A947-70E740481C1C}">
+                <a14:useLocalDpi xmlns:a14="http://schemas.microsoft.com/office/drawing/2010/main" val="0"/>
+              </a:ext>
+            </a:extLst>
+          </a:blip>
+          <a:srcRect t="4392" b="6526"/>
+          <a:stretch/>
+        </p:blipFill>
+        <p:spPr>
+          <a:xfrm>
+            <a:off x="4118385" y="2060727"/>
+            <a:ext cx="1997845" cy="994766"/>
+          </a:xfrm>
+          <a:prstGeom prst="rect">
+            <a:avLst/>
+          </a:prstGeom>
+        </p:spPr>
+      </p:pic>
+      <p:pic>
+        <p:nvPicPr>
+          <p:cNvPr id="74" name="Picture 73" descr="A picture containing text, font, screenshot, graphics&#10;&#10;Description automatically generated">
+            <a:extLst>
+              <a:ext uri="{FF2B5EF4-FFF2-40B4-BE49-F238E27FC236}">
+                <a16:creationId xmlns:a16="http://schemas.microsoft.com/office/drawing/2014/main" id="{8BE24A91-5D87-3426-CAD5-AAE381D4D0F2}"/>
+              </a:ext>
+            </a:extLst>
+          </p:cNvPr>
+          <p:cNvPicPr>
+            <a:picLocks noChangeAspect="1"/>
+          </p:cNvPicPr>
+          <p:nvPr/>
+        </p:nvPicPr>
+        <p:blipFill rotWithShape="1">
+          <a:blip r:embed="rId10">
+            <a:extLst>
+              <a:ext uri="{BEBA8EAE-BF5A-486C-A8C5-ECC9F3942E4B}">
+                <a14:imgProps xmlns:a14="http://schemas.microsoft.com/office/drawing/2010/main">
+                  <a14:imgLayer r:embed="rId9">
+                    <a14:imgEffect>
+                      <a14:brightnessContrast bright="-20000" contrast="40000"/>
+                    </a14:imgEffect>
+                  </a14:imgLayer>
+                </a14:imgProps>
+              </a:ext>
+              <a:ext uri="{28A0092B-C50C-407E-A947-70E740481C1C}">
+                <a14:useLocalDpi xmlns:a14="http://schemas.microsoft.com/office/drawing/2010/main" val="0"/>
+              </a:ext>
+            </a:extLst>
+          </a:blip>
+          <a:srcRect t="4502" b="5760"/>
+          <a:stretch/>
+        </p:blipFill>
+        <p:spPr>
+          <a:xfrm>
+            <a:off x="2066070" y="2053394"/>
+            <a:ext cx="1997845" cy="1002099"/>
+          </a:xfrm>
+          <a:prstGeom prst="rect">
+            <a:avLst/>
+          </a:prstGeom>
+        </p:spPr>
+      </p:pic>
+      <p:pic>
+        <p:nvPicPr>
+          <p:cNvPr id="76" name="Picture 75" descr="A picture containing font, screenshot, text, graphics&#10;&#10;Description automatically generated">
+            <a:extLst>
+              <a:ext uri="{FF2B5EF4-FFF2-40B4-BE49-F238E27FC236}">
+                <a16:creationId xmlns:a16="http://schemas.microsoft.com/office/drawing/2014/main" id="{DBDEA3BD-E029-2E62-6DF7-34C20466EFD1}"/>
+              </a:ext>
+            </a:extLst>
+          </p:cNvPr>
+          <p:cNvPicPr>
+            <a:picLocks noChangeAspect="1"/>
+          </p:cNvPicPr>
+          <p:nvPr/>
+        </p:nvPicPr>
+        <p:blipFill rotWithShape="1">
+          <a:blip r:embed="rId11">
+            <a:extLst>
+              <a:ext uri="{BEBA8EAE-BF5A-486C-A8C5-ECC9F3942E4B}">
+                <a14:imgProps xmlns:a14="http://schemas.microsoft.com/office/drawing/2010/main">
+                  <a14:imgLayer r:embed="rId12">
+                    <a14:imgEffect>
+                      <a14:brightnessContrast bright="-20000" contrast="40000"/>
+                    </a14:imgEffect>
+                  </a14:imgLayer>
+                </a14:imgProps>
+              </a:ext>
+              <a:ext uri="{28A0092B-C50C-407E-A947-70E740481C1C}">
+                <a14:useLocalDpi xmlns:a14="http://schemas.microsoft.com/office/drawing/2010/main" val="0"/>
+              </a:ext>
+            </a:extLst>
+          </a:blip>
+          <a:srcRect t="5400" b="5088"/>
+          <a:stretch/>
+        </p:blipFill>
+        <p:spPr>
+          <a:xfrm>
+            <a:off x="2051807" y="3092043"/>
+            <a:ext cx="1997845" cy="997093"/>
+          </a:xfrm>
+          <a:prstGeom prst="rect">
+            <a:avLst/>
+          </a:prstGeom>
+        </p:spPr>
+      </p:pic>
+      <p:pic>
+        <p:nvPicPr>
+          <p:cNvPr id="77" name="Picture 76" descr="A picture containing font, screenshot, text, graphics&#10;&#10;Description automatically generated">
+            <a:extLst>
+              <a:ext uri="{FF2B5EF4-FFF2-40B4-BE49-F238E27FC236}">
+                <a16:creationId xmlns:a16="http://schemas.microsoft.com/office/drawing/2014/main" id="{3054D391-E426-5723-7AA5-7E8C32B89919}"/>
+              </a:ext>
+            </a:extLst>
+          </p:cNvPr>
+          <p:cNvPicPr>
+            <a:picLocks noChangeAspect="1"/>
+          </p:cNvPicPr>
+          <p:nvPr/>
+        </p:nvPicPr>
+        <p:blipFill rotWithShape="1">
+          <a:blip r:embed="rId13">
+            <a:extLst>
+              <a:ext uri="{BEBA8EAE-BF5A-486C-A8C5-ECC9F3942E4B}">
+                <a14:imgProps xmlns:a14="http://schemas.microsoft.com/office/drawing/2010/main">
+                  <a14:imgLayer r:embed="rId12">
+                    <a14:imgEffect>
+                      <a14:brightnessContrast bright="40000" contrast="20000"/>
+                    </a14:imgEffect>
+                  </a14:imgLayer>
+                </a14:imgProps>
+              </a:ext>
+              <a:ext uri="{28A0092B-C50C-407E-A947-70E740481C1C}">
+                <a14:useLocalDpi xmlns:a14="http://schemas.microsoft.com/office/drawing/2010/main" val="0"/>
+              </a:ext>
+            </a:extLst>
+          </a:blip>
+          <a:srcRect t="4612" b="5426"/>
+          <a:stretch/>
+        </p:blipFill>
+        <p:spPr>
+          <a:xfrm>
+            <a:off x="4116424" y="3055493"/>
+            <a:ext cx="1997845" cy="1002099"/>
+          </a:xfrm>
+          <a:prstGeom prst="rect">
+            <a:avLst/>
+          </a:prstGeom>
+        </p:spPr>
+      </p:pic>
+      <p:pic>
+        <p:nvPicPr>
+          <p:cNvPr id="79" name="Picture 78" descr="A picture containing font, screenshot, text, graphics&#10;&#10;Description automatically generated">
+            <a:extLst>
+              <a:ext uri="{FF2B5EF4-FFF2-40B4-BE49-F238E27FC236}">
+                <a16:creationId xmlns:a16="http://schemas.microsoft.com/office/drawing/2014/main" id="{F5CC1F74-5DFE-868A-5DBE-022EFB732673}"/>
+              </a:ext>
+            </a:extLst>
+          </p:cNvPr>
+          <p:cNvPicPr>
+            <a:picLocks noChangeAspect="1"/>
+          </p:cNvPicPr>
+          <p:nvPr/>
+        </p:nvPicPr>
+        <p:blipFill rotWithShape="1">
+          <a:blip r:embed="rId14">
+            <a:extLst>
+              <a:ext uri="{BEBA8EAE-BF5A-486C-A8C5-ECC9F3942E4B}">
+                <a14:imgProps xmlns:a14="http://schemas.microsoft.com/office/drawing/2010/main">
+                  <a14:imgLayer r:embed="rId15">
+                    <a14:imgEffect>
+                      <a14:brightnessContrast bright="-20000" contrast="40000"/>
+                    </a14:imgEffect>
+                  </a14:imgLayer>
+                </a14:imgProps>
+              </a:ext>
+              <a:ext uri="{28A0092B-C50C-407E-A947-70E740481C1C}">
+                <a14:useLocalDpi xmlns:a14="http://schemas.microsoft.com/office/drawing/2010/main" val="0"/>
+              </a:ext>
+            </a:extLst>
+          </a:blip>
+          <a:srcRect t="6187" b="7031"/>
+          <a:stretch/>
+        </p:blipFill>
+        <p:spPr>
+          <a:xfrm>
+            <a:off x="2061710" y="4158057"/>
+            <a:ext cx="1995074" cy="966675"/>
+          </a:xfrm>
+          <a:prstGeom prst="rect">
+            <a:avLst/>
+          </a:prstGeom>
+        </p:spPr>
+      </p:pic>
+      <p:pic>
+        <p:nvPicPr>
+          <p:cNvPr id="80" name="Picture 79" descr="A picture containing font, screenshot, text, graphics&#10;&#10;Description automatically generated">
+            <a:extLst>
+              <a:ext uri="{FF2B5EF4-FFF2-40B4-BE49-F238E27FC236}">
+                <a16:creationId xmlns:a16="http://schemas.microsoft.com/office/drawing/2014/main" id="{3302170B-C0EF-269C-4E61-7D56BF896DF7}"/>
+              </a:ext>
+            </a:extLst>
+          </p:cNvPr>
+          <p:cNvPicPr>
+            <a:picLocks noChangeAspect="1"/>
+          </p:cNvPicPr>
+          <p:nvPr/>
+        </p:nvPicPr>
+        <p:blipFill rotWithShape="1">
+          <a:blip r:embed="rId16">
+            <a:extLst>
+              <a:ext uri="{BEBA8EAE-BF5A-486C-A8C5-ECC9F3942E4B}">
+                <a14:imgProps xmlns:a14="http://schemas.microsoft.com/office/drawing/2010/main">
+                  <a14:imgLayer r:embed="rId15">
+                    <a14:imgEffect>
+                      <a14:brightnessContrast bright="40000" contrast="20000"/>
+                    </a14:imgEffect>
+                  </a14:imgLayer>
+                </a14:imgProps>
+              </a:ext>
+              <a:ext uri="{28A0092B-C50C-407E-A947-70E740481C1C}">
+                <a14:useLocalDpi xmlns:a14="http://schemas.microsoft.com/office/drawing/2010/main" val="0"/>
+              </a:ext>
+            </a:extLst>
+          </a:blip>
+          <a:srcRect t="4876" b="5821"/>
+          <a:stretch/>
+        </p:blipFill>
+        <p:spPr>
+          <a:xfrm>
+            <a:off x="4084556" y="4172345"/>
+            <a:ext cx="1995074" cy="994767"/>
+          </a:xfrm>
+          <a:prstGeom prst="rect">
+            <a:avLst/>
+          </a:prstGeom>
+        </p:spPr>
+      </p:pic>
+      <p:pic>
+        <p:nvPicPr>
+          <p:cNvPr id="82" name="Picture 81" descr="A picture containing text, font, screenshot, graphics&#10;&#10;Description automatically generated">
+            <a:extLst>
+              <a:ext uri="{FF2B5EF4-FFF2-40B4-BE49-F238E27FC236}">
+                <a16:creationId xmlns:a16="http://schemas.microsoft.com/office/drawing/2014/main" id="{B8BA7D59-0BA8-A3BF-2563-9B4AE8FE61CF}"/>
+              </a:ext>
+            </a:extLst>
+          </p:cNvPr>
+          <p:cNvPicPr>
+            <a:picLocks noChangeAspect="1"/>
+          </p:cNvPicPr>
+          <p:nvPr/>
+        </p:nvPicPr>
+        <p:blipFill rotWithShape="1">
+          <a:blip r:embed="rId17">
+            <a:extLst>
+              <a:ext uri="{BEBA8EAE-BF5A-486C-A8C5-ECC9F3942E4B}">
+                <a14:imgProps xmlns:a14="http://schemas.microsoft.com/office/drawing/2010/main">
+                  <a14:imgLayer r:embed="rId18">
+                    <a14:imgEffect>
+                      <a14:brightnessContrast bright="-20000" contrast="40000"/>
+                    </a14:imgEffect>
+                  </a14:imgLayer>
+                </a14:imgProps>
+              </a:ext>
+              <a:ext uri="{28A0092B-C50C-407E-A947-70E740481C1C}">
+                <a14:useLocalDpi xmlns:a14="http://schemas.microsoft.com/office/drawing/2010/main" val="0"/>
+              </a:ext>
+            </a:extLst>
+          </a:blip>
+          <a:srcRect t="5710" b="6338"/>
+          <a:stretch/>
+        </p:blipFill>
+        <p:spPr>
+          <a:xfrm>
+            <a:off x="2107425" y="5187885"/>
+            <a:ext cx="1995074" cy="979714"/>
+          </a:xfrm>
+          <a:prstGeom prst="rect">
+            <a:avLst/>
+          </a:prstGeom>
+        </p:spPr>
+      </p:pic>
+      <p:pic>
+        <p:nvPicPr>
+          <p:cNvPr id="83" name="Picture 82" descr="A picture containing text, font, screenshot, graphics&#10;&#10;Description automatically generated">
+            <a:extLst>
+              <a:ext uri="{FF2B5EF4-FFF2-40B4-BE49-F238E27FC236}">
+                <a16:creationId xmlns:a16="http://schemas.microsoft.com/office/drawing/2014/main" id="{DF917B1A-001C-B379-731E-0ACB5926B355}"/>
+              </a:ext>
+            </a:extLst>
+          </p:cNvPr>
+          <p:cNvPicPr>
+            <a:picLocks noChangeAspect="1"/>
+          </p:cNvPicPr>
+          <p:nvPr/>
+        </p:nvPicPr>
+        <p:blipFill rotWithShape="1">
+          <a:blip r:embed="rId19">
+            <a:extLst>
+              <a:ext uri="{BEBA8EAE-BF5A-486C-A8C5-ECC9F3942E4B}">
+                <a14:imgProps xmlns:a14="http://schemas.microsoft.com/office/drawing/2010/main">
+                  <a14:imgLayer r:embed="rId18">
+                    <a14:imgEffect>
+                      <a14:brightnessContrast bright="40000" contrast="20000"/>
+                    </a14:imgEffect>
+                  </a14:imgLayer>
+                </a14:imgProps>
+              </a:ext>
+              <a:ext uri="{28A0092B-C50C-407E-A947-70E740481C1C}">
+                <a14:useLocalDpi xmlns:a14="http://schemas.microsoft.com/office/drawing/2010/main" val="0"/>
+              </a:ext>
+            </a:extLst>
+          </a:blip>
+          <a:srcRect t="3805" b="6233"/>
+          <a:stretch/>
+        </p:blipFill>
+        <p:spPr>
+          <a:xfrm>
+            <a:off x="4106072" y="5167112"/>
+            <a:ext cx="1995074" cy="1002099"/>
+          </a:xfrm>
+          <a:prstGeom prst="rect">
+            <a:avLst/>
+          </a:prstGeom>
+        </p:spPr>
+      </p:pic>
+      <p:pic>
+        <p:nvPicPr>
+          <p:cNvPr id="85" name="Picture 84" descr="A picture containing font, screenshot, graphics, logo&#10;&#10;Description automatically generated">
+            <a:extLst>
+              <a:ext uri="{FF2B5EF4-FFF2-40B4-BE49-F238E27FC236}">
+                <a16:creationId xmlns:a16="http://schemas.microsoft.com/office/drawing/2014/main" id="{E660DEBF-912D-DC8C-CAA0-CF696AFABA82}"/>
+              </a:ext>
+            </a:extLst>
+          </p:cNvPr>
+          <p:cNvPicPr>
+            <a:picLocks noChangeAspect="1"/>
+          </p:cNvPicPr>
+          <p:nvPr/>
+        </p:nvPicPr>
+        <p:blipFill>
+          <a:blip r:embed="rId20">
+            <a:extLst>
+              <a:ext uri="{BEBA8EAE-BF5A-486C-A8C5-ECC9F3942E4B}">
+                <a14:imgProps xmlns:a14="http://schemas.microsoft.com/office/drawing/2010/main">
+                  <a14:imgLayer r:embed="rId21">
+                    <a14:imgEffect>
+                      <a14:brightnessContrast bright="-20000" contrast="40000"/>
+                    </a14:imgEffect>
+                  </a14:imgLayer>
+                </a14:imgProps>
+              </a:ext>
+              <a:ext uri="{28A0092B-C50C-407E-A947-70E740481C1C}">
+                <a14:useLocalDpi xmlns:a14="http://schemas.microsoft.com/office/drawing/2010/main" val="0"/>
+              </a:ext>
+            </a:extLst>
+          </a:blip>
+          <a:stretch>
+            <a:fillRect/>
+          </a:stretch>
+        </p:blipFill>
+        <p:spPr>
+          <a:xfrm>
+            <a:off x="8242907" y="61894"/>
+            <a:ext cx="1995074" cy="994766"/>
+          </a:xfrm>
+          <a:prstGeom prst="rect">
+            <a:avLst/>
+          </a:prstGeom>
+        </p:spPr>
+      </p:pic>
+      <p:pic>
+        <p:nvPicPr>
+          <p:cNvPr id="86" name="Picture 85" descr="A picture containing font, screenshot, graphics, logo&#10;&#10;Description automatically generated">
+            <a:extLst>
+              <a:ext uri="{FF2B5EF4-FFF2-40B4-BE49-F238E27FC236}">
+                <a16:creationId xmlns:a16="http://schemas.microsoft.com/office/drawing/2014/main" id="{4083FCEB-95B1-079D-3EDA-02829AE90518}"/>
+              </a:ext>
+            </a:extLst>
+          </p:cNvPr>
+          <p:cNvPicPr>
+            <a:picLocks noChangeAspect="1"/>
+          </p:cNvPicPr>
+          <p:nvPr/>
+        </p:nvPicPr>
+        <p:blipFill>
+          <a:blip r:embed="rId22">
+            <a:extLst>
+              <a:ext uri="{BEBA8EAE-BF5A-486C-A8C5-ECC9F3942E4B}">
+                <a14:imgProps xmlns:a14="http://schemas.microsoft.com/office/drawing/2010/main">
+                  <a14:imgLayer r:embed="rId21">
+                    <a14:imgEffect>
+                      <a14:brightnessContrast bright="40000" contrast="20000"/>
+                    </a14:imgEffect>
+                  </a14:imgLayer>
+                </a14:imgProps>
+              </a:ext>
+              <a:ext uri="{28A0092B-C50C-407E-A947-70E740481C1C}">
+                <a14:useLocalDpi xmlns:a14="http://schemas.microsoft.com/office/drawing/2010/main" val="0"/>
+              </a:ext>
+            </a:extLst>
+          </a:blip>
+          <a:stretch>
+            <a:fillRect/>
+          </a:stretch>
+        </p:blipFill>
+        <p:spPr>
+          <a:xfrm>
+            <a:off x="10265738" y="82307"/>
+            <a:ext cx="1995074" cy="994766"/>
+          </a:xfrm>
+          <a:prstGeom prst="rect">
+            <a:avLst/>
+          </a:prstGeom>
+        </p:spPr>
+      </p:pic>
+      <p:pic>
+        <p:nvPicPr>
+          <p:cNvPr id="89" name="Picture 88" descr="A brown sign with white text&#10;&#10;Description automatically generated with low confidence">
+            <a:extLst>
+              <a:ext uri="{FF2B5EF4-FFF2-40B4-BE49-F238E27FC236}">
+                <a16:creationId xmlns:a16="http://schemas.microsoft.com/office/drawing/2014/main" id="{D32A7677-A724-878B-F84F-051FD4A0CD2D}"/>
+              </a:ext>
+            </a:extLst>
+          </p:cNvPr>
+          <p:cNvPicPr>
+            <a:picLocks noChangeAspect="1"/>
+          </p:cNvPicPr>
+          <p:nvPr/>
+        </p:nvPicPr>
+        <p:blipFill rotWithShape="1">
+          <a:blip r:embed="rId23">
+            <a:extLst>
+              <a:ext uri="{BEBA8EAE-BF5A-486C-A8C5-ECC9F3942E4B}">
+                <a14:imgProps xmlns:a14="http://schemas.microsoft.com/office/drawing/2010/main">
+                  <a14:imgLayer r:embed="rId24">
+                    <a14:imgEffect>
+                      <a14:brightnessContrast bright="40000" contrast="20000"/>
+                    </a14:imgEffect>
+                  </a14:imgLayer>
+                </a14:imgProps>
+              </a:ext>
+              <a:ext uri="{28A0092B-C50C-407E-A947-70E740481C1C}">
+                <a14:useLocalDpi xmlns:a14="http://schemas.microsoft.com/office/drawing/2010/main" val="0"/>
+              </a:ext>
+            </a:extLst>
+          </a:blip>
+          <a:srcRect t="4653" b="6044"/>
+          <a:stretch/>
+        </p:blipFill>
+        <p:spPr>
+          <a:xfrm>
+            <a:off x="10225432" y="1053950"/>
+            <a:ext cx="1995074" cy="994767"/>
+          </a:xfrm>
+          <a:prstGeom prst="rect">
+            <a:avLst/>
+          </a:prstGeom>
+        </p:spPr>
+      </p:pic>
+      <p:pic>
+        <p:nvPicPr>
+          <p:cNvPr id="90" name="Picture 89" descr="A brown sign with white text&#10;&#10;Description automatically generated with low confidence">
+            <a:extLst>
+              <a:ext uri="{FF2B5EF4-FFF2-40B4-BE49-F238E27FC236}">
+                <a16:creationId xmlns:a16="http://schemas.microsoft.com/office/drawing/2014/main" id="{8AF60EEE-4DE5-8F34-98CF-F6F1ECB4D900}"/>
+              </a:ext>
+            </a:extLst>
+          </p:cNvPr>
+          <p:cNvPicPr>
+            <a:picLocks noChangeAspect="1"/>
+          </p:cNvPicPr>
+          <p:nvPr/>
+        </p:nvPicPr>
+        <p:blipFill rotWithShape="1">
+          <a:blip r:embed="rId25">
+            <a:extLst>
+              <a:ext uri="{BEBA8EAE-BF5A-486C-A8C5-ECC9F3942E4B}">
+                <a14:imgProps xmlns:a14="http://schemas.microsoft.com/office/drawing/2010/main">
+                  <a14:imgLayer r:embed="rId24">
+                    <a14:imgEffect>
+                      <a14:brightnessContrast bright="-20000" contrast="40000"/>
+                    </a14:imgEffect>
+                  </a14:imgLayer>
+                </a14:imgProps>
+              </a:ext>
+              <a:ext uri="{28A0092B-C50C-407E-A947-70E740481C1C}">
+                <a14:useLocalDpi xmlns:a14="http://schemas.microsoft.com/office/drawing/2010/main" val="0"/>
+              </a:ext>
+            </a:extLst>
+          </a:blip>
+          <a:srcRect t="5267" b="6427"/>
+          <a:stretch/>
+        </p:blipFill>
+        <p:spPr>
+          <a:xfrm>
+            <a:off x="8222603" y="1077073"/>
+            <a:ext cx="1995074" cy="983654"/>
+          </a:xfrm>
+          <a:prstGeom prst="rect">
+            <a:avLst/>
+          </a:prstGeom>
+        </p:spPr>
+      </p:pic>
+      <p:grpSp>
+        <p:nvGrpSpPr>
+          <p:cNvPr id="91" name="Group 90">
+            <a:extLst>
+              <a:ext uri="{FF2B5EF4-FFF2-40B4-BE49-F238E27FC236}">
+                <a16:creationId xmlns:a16="http://schemas.microsoft.com/office/drawing/2014/main" id="{3B159EEE-B75B-7333-FAC4-AA4ABCF088BE}"/>
+              </a:ext>
+            </a:extLst>
+          </p:cNvPr>
+          <p:cNvGrpSpPr/>
+          <p:nvPr/>
+        </p:nvGrpSpPr>
+        <p:grpSpPr>
+          <a:xfrm>
+            <a:off x="6212913" y="2104166"/>
+            <a:ext cx="2029994" cy="987877"/>
+            <a:chOff x="816213" y="871448"/>
+            <a:chExt cx="2029994" cy="987877"/>
+          </a:xfrm>
+        </p:grpSpPr>
+        <p:grpSp>
+          <p:nvGrpSpPr>
+            <p:cNvPr id="92" name="Group 91">
+              <a:extLst>
+                <a:ext uri="{FF2B5EF4-FFF2-40B4-BE49-F238E27FC236}">
+                  <a16:creationId xmlns:a16="http://schemas.microsoft.com/office/drawing/2014/main" id="{569AA105-0F96-7E08-CA42-D5196D624F22}"/>
+                </a:ext>
+              </a:extLst>
+            </p:cNvPr>
+            <p:cNvGrpSpPr/>
+            <p:nvPr/>
+          </p:nvGrpSpPr>
+          <p:grpSpPr>
+            <a:xfrm>
+              <a:off x="816213" y="871448"/>
+              <a:ext cx="2029994" cy="987877"/>
+              <a:chOff x="610473" y="666072"/>
+              <a:chExt cx="2029994" cy="987877"/>
+            </a:xfrm>
+          </p:grpSpPr>
+          <p:sp>
+            <p:nvSpPr>
+              <p:cNvPr id="95" name="Rectangle: Rounded Corners 94">
+                <a:extLst>
+                  <a:ext uri="{FF2B5EF4-FFF2-40B4-BE49-F238E27FC236}">
+                    <a16:creationId xmlns:a16="http://schemas.microsoft.com/office/drawing/2014/main" id="{F0A8EB39-A50F-C04C-0320-2FA51891A721}"/>
+                  </a:ext>
+                </a:extLst>
+              </p:cNvPr>
+              <p:cNvSpPr/>
+              <p:nvPr/>
+            </p:nvSpPr>
+            <p:spPr>
+              <a:xfrm>
+                <a:off x="648382" y="666072"/>
+                <a:ext cx="1992085" cy="987877"/>
+              </a:xfrm>
+              <a:prstGeom prst="roundRect">
+                <a:avLst/>
+              </a:prstGeom>
+              <a:solidFill>
+                <a:schemeClr val="tx1">
+                  <a:lumMod val="95000"/>
+                  <a:lumOff val="5000"/>
+                </a:schemeClr>
+              </a:solidFill>
+              <a:ln>
+                <a:noFill/>
+              </a:ln>
+            </p:spPr>
+            <p:style>
+              <a:lnRef idx="2">
+                <a:schemeClr val="accent1">
+                  <a:shade val="50000"/>
+                </a:schemeClr>
+              </a:lnRef>
+              <a:fillRef idx="1">
+                <a:schemeClr val="accent1"/>
+              </a:fillRef>
+              <a:effectRef idx="0">
+                <a:schemeClr val="accent1"/>
+              </a:effectRef>
+              <a:fontRef idx="minor">
+                <a:schemeClr val="lt1"/>
+              </a:fontRef>
+            </p:style>
+            <p:txBody>
+              <a:bodyPr rtlCol="0" anchor="ctr"/>
+              <a:lstStyle/>
+              <a:p>
+                <a:pPr algn="ctr"/>
+                <a:endParaRPr lang="en-GB"/>
+              </a:p>
+            </p:txBody>
+          </p:sp>
+          <p:sp>
+            <p:nvSpPr>
+              <p:cNvPr id="96" name="Rectangle: Rounded Corners 95">
+                <a:extLst>
+                  <a:ext uri="{FF2B5EF4-FFF2-40B4-BE49-F238E27FC236}">
+                    <a16:creationId xmlns:a16="http://schemas.microsoft.com/office/drawing/2014/main" id="{695B2E40-58AE-A7DF-3FFE-1FEF2FF68A82}"/>
+                  </a:ext>
+                </a:extLst>
+              </p:cNvPr>
+              <p:cNvSpPr/>
+              <p:nvPr/>
+            </p:nvSpPr>
+            <p:spPr>
+              <a:xfrm>
+                <a:off x="656546" y="674236"/>
+                <a:ext cx="1951264" cy="955221"/>
+              </a:xfrm>
+              <a:prstGeom prst="roundRect">
+                <a:avLst/>
+              </a:prstGeom>
+              <a:solidFill>
+                <a:srgbClr val="843C0C"/>
+              </a:solidFill>
+              <a:ln>
+                <a:noFill/>
+              </a:ln>
+            </p:spPr>
+            <p:style>
+              <a:lnRef idx="2">
+                <a:schemeClr val="accent1">
+                  <a:shade val="50000"/>
+                </a:schemeClr>
+              </a:lnRef>
+              <a:fillRef idx="1">
+                <a:schemeClr val="accent1"/>
+              </a:fillRef>
+              <a:effectRef idx="0">
+                <a:schemeClr val="accent1"/>
+              </a:effectRef>
+              <a:fontRef idx="minor">
+                <a:schemeClr val="lt1"/>
+              </a:fontRef>
+            </p:style>
+            <p:txBody>
+              <a:bodyPr rtlCol="0" anchor="ctr"/>
+              <a:lstStyle/>
+              <a:p>
+                <a:pPr algn="ctr"/>
+                <a:endParaRPr lang="en-GB"/>
+              </a:p>
+            </p:txBody>
+          </p:sp>
+          <p:sp>
+            <p:nvSpPr>
+              <p:cNvPr id="97" name="Rectangle: Rounded Corners 96">
+                <a:extLst>
+                  <a:ext uri="{FF2B5EF4-FFF2-40B4-BE49-F238E27FC236}">
+                    <a16:creationId xmlns:a16="http://schemas.microsoft.com/office/drawing/2014/main" id="{6527F8D7-6F48-7025-1F55-E9AC2495C8C5}"/>
+                  </a:ext>
+                </a:extLst>
+              </p:cNvPr>
+              <p:cNvSpPr/>
+              <p:nvPr/>
+            </p:nvSpPr>
+            <p:spPr>
+              <a:xfrm>
+                <a:off x="648382" y="666072"/>
+                <a:ext cx="1902278" cy="898069"/>
+              </a:xfrm>
+              <a:prstGeom prst="roundRect">
+                <a:avLst/>
+              </a:prstGeom>
+              <a:solidFill>
+                <a:srgbClr val="C55A11"/>
+              </a:solidFill>
+              <a:ln>
+                <a:noFill/>
+              </a:ln>
+            </p:spPr>
+            <p:style>
+              <a:lnRef idx="2">
+                <a:schemeClr val="accent1">
+                  <a:shade val="50000"/>
+                </a:schemeClr>
+              </a:lnRef>
+              <a:fillRef idx="1">
+                <a:schemeClr val="accent1"/>
+              </a:fillRef>
+              <a:effectRef idx="0">
+                <a:schemeClr val="accent1"/>
+              </a:effectRef>
+              <a:fontRef idx="minor">
+                <a:schemeClr val="lt1"/>
+              </a:fontRef>
+            </p:style>
+            <p:txBody>
+              <a:bodyPr rtlCol="0" anchor="ctr"/>
+              <a:lstStyle/>
+              <a:p>
+                <a:pPr algn="ctr"/>
+                <a:r>
+                  <a:rPr lang="en-GB" sz="2650" dirty="0">
+                    <a:latin typeface="Harlow Solid Italic" panose="04030604020F02020D02" pitchFamily="82" charset="0"/>
+                  </a:rPr>
+                  <a:t>Get </a:t>
+                </a:r>
+                <a:r>
+                  <a:rPr lang="en-GB" sz="2650" dirty="0" err="1">
+                    <a:latin typeface="Harlow Solid Italic" panose="04030604020F02020D02" pitchFamily="82" charset="0"/>
+                  </a:rPr>
+                  <a:t>Farmin</a:t>
+                </a:r>
+                <a:r>
+                  <a:rPr lang="en-GB" sz="2650" dirty="0">
+                    <a:latin typeface="Harlow Solid Italic" panose="04030604020F02020D02" pitchFamily="82" charset="0"/>
+                  </a:rPr>
+                  <a:t>’</a:t>
+                </a:r>
+              </a:p>
+            </p:txBody>
+          </p:sp>
+          <p:sp>
+            <p:nvSpPr>
+              <p:cNvPr id="98" name="Chord 9">
+                <a:extLst>
+                  <a:ext uri="{FF2B5EF4-FFF2-40B4-BE49-F238E27FC236}">
+                    <a16:creationId xmlns:a16="http://schemas.microsoft.com/office/drawing/2014/main" id="{83C7A5F6-AC88-D696-0528-3180E64113F0}"/>
+                  </a:ext>
+                </a:extLst>
+              </p:cNvPr>
+              <p:cNvSpPr/>
+              <p:nvPr/>
+            </p:nvSpPr>
+            <p:spPr>
+              <a:xfrm rot="4261369">
+                <a:off x="694792" y="587271"/>
+                <a:ext cx="175920" cy="344558"/>
+              </a:xfrm>
+              <a:custGeom>
+                <a:avLst/>
+                <a:gdLst>
+                  <a:gd name="connsiteX0" fmla="*/ 175910 w 444680"/>
+                  <a:gd name="connsiteY0" fmla="*/ 388062 h 392387"/>
+                  <a:gd name="connsiteX1" fmla="*/ 8875 w 444680"/>
+                  <a:gd name="connsiteY1" fmla="*/ 251073 h 392387"/>
+                  <a:gd name="connsiteX2" fmla="*/ 82723 w 444680"/>
+                  <a:gd name="connsiteY2" fmla="*/ 43504 h 392387"/>
+                  <a:gd name="connsiteX3" fmla="*/ 175910 w 444680"/>
+                  <a:gd name="connsiteY3" fmla="*/ 388062 h 392387"/>
+                  <a:gd name="connsiteX0" fmla="*/ 175920 w 175920"/>
+                  <a:gd name="connsiteY0" fmla="*/ 344558 h 344558"/>
+                  <a:gd name="connsiteX1" fmla="*/ 8885 w 175920"/>
+                  <a:gd name="connsiteY1" fmla="*/ 207569 h 344558"/>
+                  <a:gd name="connsiteX2" fmla="*/ 82733 w 175920"/>
+                  <a:gd name="connsiteY2" fmla="*/ 0 h 344558"/>
+                  <a:gd name="connsiteX3" fmla="*/ 75635 w 175920"/>
+                  <a:gd name="connsiteY3" fmla="*/ 179040 h 344558"/>
+                  <a:gd name="connsiteX4" fmla="*/ 175920 w 175920"/>
+                  <a:gd name="connsiteY4" fmla="*/ 344558 h 344558"/>
+                  <a:gd name="connsiteX0" fmla="*/ 175920 w 175920"/>
+                  <a:gd name="connsiteY0" fmla="*/ 344558 h 344558"/>
+                  <a:gd name="connsiteX1" fmla="*/ 8885 w 175920"/>
+                  <a:gd name="connsiteY1" fmla="*/ 207569 h 344558"/>
+                  <a:gd name="connsiteX2" fmla="*/ 82733 w 175920"/>
+                  <a:gd name="connsiteY2" fmla="*/ 0 h 344558"/>
+                  <a:gd name="connsiteX3" fmla="*/ 72609 w 175920"/>
+                  <a:gd name="connsiteY3" fmla="*/ 180517 h 344558"/>
+                  <a:gd name="connsiteX4" fmla="*/ 175920 w 175920"/>
+                  <a:gd name="connsiteY4" fmla="*/ 344558 h 344558"/>
+                  <a:gd name="connsiteX0" fmla="*/ 175920 w 175920"/>
+                  <a:gd name="connsiteY0" fmla="*/ 344558 h 344558"/>
+                  <a:gd name="connsiteX1" fmla="*/ 8885 w 175920"/>
+                  <a:gd name="connsiteY1" fmla="*/ 207569 h 344558"/>
+                  <a:gd name="connsiteX2" fmla="*/ 82733 w 175920"/>
+                  <a:gd name="connsiteY2" fmla="*/ 0 h 344558"/>
+                  <a:gd name="connsiteX3" fmla="*/ 72609 w 175920"/>
+                  <a:gd name="connsiteY3" fmla="*/ 180517 h 344558"/>
+                  <a:gd name="connsiteX4" fmla="*/ 175920 w 175920"/>
+                  <a:gd name="connsiteY4" fmla="*/ 344558 h 344558"/>
+                  <a:gd name="connsiteX0" fmla="*/ 175920 w 175920"/>
+                  <a:gd name="connsiteY0" fmla="*/ 344558 h 344558"/>
+                  <a:gd name="connsiteX1" fmla="*/ 8885 w 175920"/>
+                  <a:gd name="connsiteY1" fmla="*/ 207569 h 344558"/>
+                  <a:gd name="connsiteX2" fmla="*/ 82733 w 175920"/>
+                  <a:gd name="connsiteY2" fmla="*/ 0 h 344558"/>
+                  <a:gd name="connsiteX3" fmla="*/ 72609 w 175920"/>
+                  <a:gd name="connsiteY3" fmla="*/ 180517 h 344558"/>
+                  <a:gd name="connsiteX4" fmla="*/ 175920 w 175920"/>
+                  <a:gd name="connsiteY4" fmla="*/ 344558 h 344558"/>
+                  <a:gd name="connsiteX0" fmla="*/ 175920 w 175920"/>
+                  <a:gd name="connsiteY0" fmla="*/ 344558 h 344558"/>
+                  <a:gd name="connsiteX1" fmla="*/ 8885 w 175920"/>
+                  <a:gd name="connsiteY1" fmla="*/ 207569 h 344558"/>
+                  <a:gd name="connsiteX2" fmla="*/ 82733 w 175920"/>
+                  <a:gd name="connsiteY2" fmla="*/ 0 h 344558"/>
+                  <a:gd name="connsiteX3" fmla="*/ 54451 w 175920"/>
+                  <a:gd name="connsiteY3" fmla="*/ 189383 h 344558"/>
+                  <a:gd name="connsiteX4" fmla="*/ 175920 w 175920"/>
+                  <a:gd name="connsiteY4" fmla="*/ 344558 h 344558"/>
+                </a:gdLst>
+                <a:ahLst/>
+                <a:cxnLst>
+                  <a:cxn ang="0">
+                    <a:pos x="connsiteX0" y="connsiteY0"/>
+                  </a:cxn>
+                  <a:cxn ang="0">
+                    <a:pos x="connsiteX1" y="connsiteY1"/>
+                  </a:cxn>
+                  <a:cxn ang="0">
+                    <a:pos x="connsiteX2" y="connsiteY2"/>
+                  </a:cxn>
+                  <a:cxn ang="0">
+                    <a:pos x="connsiteX3" y="connsiteY3"/>
+                  </a:cxn>
+                  <a:cxn ang="0">
+                    <a:pos x="connsiteX4" y="connsiteY4"/>
+                  </a:cxn>
+                </a:cxnLst>
+                <a:rect l="l" t="t" r="r" b="b"/>
+                <a:pathLst>
+                  <a:path w="175920" h="344558">
+                    <a:moveTo>
+                      <a:pt x="175920" y="344558"/>
+                    </a:moveTo>
+                    <a:cubicBezTo>
+                      <a:pt x="95923" y="329485"/>
+                      <a:pt x="31766" y="276868"/>
+                      <a:pt x="8885" y="207569"/>
+                    </a:cubicBezTo>
+                    <a:cubicBezTo>
+                      <a:pt x="-16208" y="131569"/>
+                      <a:pt x="12916" y="49707"/>
+                      <a:pt x="82733" y="0"/>
+                    </a:cubicBezTo>
+                    <a:cubicBezTo>
+                      <a:pt x="97444" y="58838"/>
+                      <a:pt x="13492" y="119001"/>
+                      <a:pt x="54451" y="189383"/>
+                    </a:cubicBezTo>
+                    <a:cubicBezTo>
+                      <a:pt x="48141" y="252714"/>
+                      <a:pt x="159569" y="288543"/>
+                      <a:pt x="175920" y="344558"/>
+                    </a:cubicBezTo>
+                    <a:close/>
+                  </a:path>
+                </a:pathLst>
+              </a:custGeom>
+              <a:solidFill>
+                <a:srgbClr val="FFFFFF">
+                  <a:alpha val="76078"/>
+                </a:srgbClr>
+              </a:solidFill>
+              <a:ln>
+                <a:noFill/>
+              </a:ln>
+            </p:spPr>
+            <p:style>
+              <a:lnRef idx="2">
+                <a:schemeClr val="accent1">
+                  <a:shade val="50000"/>
+                </a:schemeClr>
+              </a:lnRef>
+              <a:fillRef idx="1">
+                <a:schemeClr val="accent1"/>
+              </a:fillRef>
+              <a:effectRef idx="0">
+                <a:schemeClr val="accent1"/>
+              </a:effectRef>
+              <a:fontRef idx="minor">
+                <a:schemeClr val="lt1"/>
+              </a:fontRef>
+            </p:style>
+            <p:txBody>
+              <a:bodyPr rtlCol="0" anchor="ctr"/>
+              <a:lstStyle/>
+              <a:p>
+                <a:pPr algn="ctr"/>
+                <a:endParaRPr lang="en-GB" dirty="0"/>
+              </a:p>
+            </p:txBody>
+          </p:sp>
+        </p:grpSp>
+        <p:cxnSp>
+          <p:nvCxnSpPr>
+            <p:cNvPr id="93" name="Straight Connector 92">
+              <a:extLst>
+                <a:ext uri="{FF2B5EF4-FFF2-40B4-BE49-F238E27FC236}">
+                  <a16:creationId xmlns:a16="http://schemas.microsoft.com/office/drawing/2014/main" id="{8E234E33-5F34-F63D-5671-36574218E3A6}"/>
+                </a:ext>
+              </a:extLst>
+            </p:cNvPr>
+            <p:cNvCxnSpPr>
+              <a:cxnSpLocks/>
+            </p:cNvCxnSpPr>
+            <p:nvPr/>
+          </p:nvCxnSpPr>
+          <p:spPr>
+            <a:xfrm>
+              <a:off x="1049696" y="893901"/>
+              <a:ext cx="1045804" cy="0"/>
+            </a:xfrm>
+            <a:prstGeom prst="line">
+              <a:avLst/>
+            </a:prstGeom>
+            <a:ln w="38100">
+              <a:solidFill>
+                <a:srgbClr val="F1D8C6"/>
+              </a:solidFill>
+            </a:ln>
+          </p:spPr>
+          <p:style>
+            <a:lnRef idx="1">
+              <a:schemeClr val="accent1"/>
+            </a:lnRef>
+            <a:fillRef idx="0">
+              <a:schemeClr val="accent1"/>
+            </a:fillRef>
+            <a:effectRef idx="0">
+              <a:schemeClr val="accent1"/>
+            </a:effectRef>
+            <a:fontRef idx="minor">
+              <a:schemeClr val="tx1"/>
+            </a:fontRef>
+          </p:style>
+        </p:cxnSp>
+        <p:cxnSp>
+          <p:nvCxnSpPr>
+            <p:cNvPr id="94" name="Straight Connector 93">
+              <a:extLst>
+                <a:ext uri="{FF2B5EF4-FFF2-40B4-BE49-F238E27FC236}">
+                  <a16:creationId xmlns:a16="http://schemas.microsoft.com/office/drawing/2014/main" id="{25D80AE4-A0DB-5394-99FA-3A58921C7202}"/>
+                </a:ext>
+              </a:extLst>
+            </p:cNvPr>
+            <p:cNvCxnSpPr>
+              <a:cxnSpLocks/>
+            </p:cNvCxnSpPr>
+            <p:nvPr/>
+          </p:nvCxnSpPr>
+          <p:spPr>
+            <a:xfrm>
+              <a:off x="869906" y="1023441"/>
+              <a:ext cx="0" cy="439599"/>
+            </a:xfrm>
+            <a:prstGeom prst="line">
+              <a:avLst/>
+            </a:prstGeom>
+            <a:ln w="38100">
+              <a:solidFill>
+                <a:srgbClr val="F1D8C6"/>
+              </a:solidFill>
+            </a:ln>
+          </p:spPr>
+          <p:style>
+            <a:lnRef idx="1">
+              <a:schemeClr val="accent1"/>
+            </a:lnRef>
+            <a:fillRef idx="0">
+              <a:schemeClr val="accent1"/>
+            </a:fillRef>
+            <a:effectRef idx="0">
+              <a:schemeClr val="accent1"/>
+            </a:effectRef>
+            <a:fontRef idx="minor">
+              <a:schemeClr val="tx1"/>
+            </a:fontRef>
+          </p:style>
+        </p:cxnSp>
+      </p:grpSp>
+      <p:pic>
+        <p:nvPicPr>
+          <p:cNvPr id="102" name="Picture 101" descr="A picture containing font, screenshot, text, graphics&#10;&#10;Description automatically generated">
+            <a:extLst>
+              <a:ext uri="{FF2B5EF4-FFF2-40B4-BE49-F238E27FC236}">
+                <a16:creationId xmlns:a16="http://schemas.microsoft.com/office/drawing/2014/main" id="{A51EE1BB-55C3-EB19-CE1C-A6B22A504CB3}"/>
+              </a:ext>
+            </a:extLst>
+          </p:cNvPr>
+          <p:cNvPicPr>
+            <a:picLocks noChangeAspect="1"/>
+          </p:cNvPicPr>
+          <p:nvPr/>
+        </p:nvPicPr>
+        <p:blipFill rotWithShape="1">
+          <a:blip r:embed="rId26">
+            <a:extLst>
+              <a:ext uri="{BEBA8EAE-BF5A-486C-A8C5-ECC9F3942E4B}">
+                <a14:imgProps xmlns:a14="http://schemas.microsoft.com/office/drawing/2010/main">
+                  <a14:imgLayer r:embed="rId27">
+                    <a14:imgEffect>
+                      <a14:brightnessContrast bright="-20000" contrast="40000"/>
+                    </a14:imgEffect>
+                  </a14:imgLayer>
+                </a14:imgProps>
+              </a:ext>
+              <a:ext uri="{28A0092B-C50C-407E-A947-70E740481C1C}">
+                <a14:useLocalDpi xmlns:a14="http://schemas.microsoft.com/office/drawing/2010/main" val="0"/>
+              </a:ext>
+            </a:extLst>
+          </a:blip>
+          <a:srcRect t="4722" b="5317"/>
+          <a:stretch/>
+        </p:blipFill>
+        <p:spPr>
+          <a:xfrm>
+            <a:off x="8255533" y="2133732"/>
+            <a:ext cx="1997845" cy="1002099"/>
+          </a:xfrm>
+          <a:prstGeom prst="rect">
+            <a:avLst/>
+          </a:prstGeom>
+        </p:spPr>
+      </p:pic>
+      <p:pic>
+        <p:nvPicPr>
+          <p:cNvPr id="103" name="Picture 102" descr="A picture containing font, screenshot, text, graphics&#10;&#10;Description automatically generated">
+            <a:extLst>
+              <a:ext uri="{FF2B5EF4-FFF2-40B4-BE49-F238E27FC236}">
+                <a16:creationId xmlns:a16="http://schemas.microsoft.com/office/drawing/2014/main" id="{2F4EB06A-1D03-800C-5165-E94F99A9C340}"/>
+              </a:ext>
+            </a:extLst>
+          </p:cNvPr>
+          <p:cNvPicPr>
+            <a:picLocks noChangeAspect="1"/>
+          </p:cNvPicPr>
+          <p:nvPr/>
+        </p:nvPicPr>
+        <p:blipFill rotWithShape="1">
+          <a:blip r:embed="rId28">
+            <a:extLst>
+              <a:ext uri="{BEBA8EAE-BF5A-486C-A8C5-ECC9F3942E4B}">
+                <a14:imgProps xmlns:a14="http://schemas.microsoft.com/office/drawing/2010/main">
+                  <a14:imgLayer r:embed="rId27">
+                    <a14:imgEffect>
+                      <a14:brightnessContrast bright="40000" contrast="20000"/>
+                    </a14:imgEffect>
+                  </a14:imgLayer>
+                </a14:imgProps>
+              </a:ext>
+              <a:ext uri="{28A0092B-C50C-407E-A947-70E740481C1C}">
+                <a14:useLocalDpi xmlns:a14="http://schemas.microsoft.com/office/drawing/2010/main" val="0"/>
+              </a:ext>
+            </a:extLst>
+          </a:blip>
+          <a:srcRect t="4455" b="6519"/>
+          <a:stretch/>
+        </p:blipFill>
+        <p:spPr>
+          <a:xfrm>
+            <a:off x="10271597" y="2144159"/>
+            <a:ext cx="1997845" cy="991672"/>
+          </a:xfrm>
+          <a:prstGeom prst="rect">
+            <a:avLst/>
+          </a:prstGeom>
+        </p:spPr>
+      </p:pic>
     </p:spTree>
     <p:extLst>
       <p:ext uri="{BB962C8B-B14F-4D97-AF65-F5344CB8AC3E}">

</xml_diff>